<commit_message>
update slide java core
</commit_message>
<xml_diff>
--- a/2. Back-end/1. JavaCore/Bài 12. Abstract and Interface/05. Abstract and Interface.pptx
+++ b/2. Back-end/1. JavaCore/Bài 12. Abstract and Interface/05. Abstract and Interface.pptx
@@ -17,14 +17,15 @@
     <p:sldId id="272" r:id="rId11"/>
     <p:sldId id="273" r:id="rId12"/>
     <p:sldId id="261" r:id="rId13"/>
-    <p:sldId id="262" r:id="rId14"/>
-    <p:sldId id="263" r:id="rId15"/>
-    <p:sldId id="264" r:id="rId16"/>
-    <p:sldId id="265" r:id="rId17"/>
-    <p:sldId id="266" r:id="rId18"/>
-    <p:sldId id="267" r:id="rId19"/>
-    <p:sldId id="268" r:id="rId20"/>
-    <p:sldId id="269" r:id="rId21"/>
+    <p:sldId id="279" r:id="rId14"/>
+    <p:sldId id="262" r:id="rId15"/>
+    <p:sldId id="263" r:id="rId16"/>
+    <p:sldId id="264" r:id="rId17"/>
+    <p:sldId id="265" r:id="rId18"/>
+    <p:sldId id="266" r:id="rId19"/>
+    <p:sldId id="267" r:id="rId20"/>
+    <p:sldId id="268" r:id="rId21"/>
+    <p:sldId id="269" r:id="rId22"/>
   </p:sldIdLst>
   <p:sldSz cx="9144000" cy="6858000" type="screen4x3"/>
   <p:notesSz cx="6858000" cy="9144000"/>
@@ -308,7 +309,7 @@
             <a:fld id="{1D8BD707-D9CF-40AE-B4C6-C98DA3205C09}" type="datetimeFigureOut">
               <a:rPr lang="en-US" smtClean="0"/>
               <a:pPr/>
-              <a:t>7/3/2018</a:t>
+              <a:t>10/14/2020</a:t>
             </a:fld>
             <a:endParaRPr lang="en-US"/>
           </a:p>
@@ -475,7 +476,7 @@
             <a:fld id="{1D8BD707-D9CF-40AE-B4C6-C98DA3205C09}" type="datetimeFigureOut">
               <a:rPr lang="en-US" smtClean="0"/>
               <a:pPr/>
-              <a:t>7/3/2018</a:t>
+              <a:t>10/14/2020</a:t>
             </a:fld>
             <a:endParaRPr lang="en-US"/>
           </a:p>
@@ -652,7 +653,7 @@
             <a:fld id="{1D8BD707-D9CF-40AE-B4C6-C98DA3205C09}" type="datetimeFigureOut">
               <a:rPr lang="en-US" smtClean="0"/>
               <a:pPr/>
-              <a:t>7/3/2018</a:t>
+              <a:t>10/14/2020</a:t>
             </a:fld>
             <a:endParaRPr lang="en-US"/>
           </a:p>
@@ -819,7 +820,7 @@
             <a:fld id="{1D8BD707-D9CF-40AE-B4C6-C98DA3205C09}" type="datetimeFigureOut">
               <a:rPr lang="en-US" smtClean="0"/>
               <a:pPr/>
-              <a:t>7/3/2018</a:t>
+              <a:t>10/14/2020</a:t>
             </a:fld>
             <a:endParaRPr lang="en-US"/>
           </a:p>
@@ -1062,7 +1063,7 @@
             <a:fld id="{1D8BD707-D9CF-40AE-B4C6-C98DA3205C09}" type="datetimeFigureOut">
               <a:rPr lang="en-US" smtClean="0"/>
               <a:pPr/>
-              <a:t>7/3/2018</a:t>
+              <a:t>10/14/2020</a:t>
             </a:fld>
             <a:endParaRPr lang="en-US"/>
           </a:p>
@@ -1347,7 +1348,7 @@
             <a:fld id="{1D8BD707-D9CF-40AE-B4C6-C98DA3205C09}" type="datetimeFigureOut">
               <a:rPr lang="en-US" smtClean="0"/>
               <a:pPr/>
-              <a:t>7/3/2018</a:t>
+              <a:t>10/14/2020</a:t>
             </a:fld>
             <a:endParaRPr lang="en-US"/>
           </a:p>
@@ -1766,7 +1767,7 @@
             <a:fld id="{1D8BD707-D9CF-40AE-B4C6-C98DA3205C09}" type="datetimeFigureOut">
               <a:rPr lang="en-US" smtClean="0"/>
               <a:pPr/>
-              <a:t>7/3/2018</a:t>
+              <a:t>10/14/2020</a:t>
             </a:fld>
             <a:endParaRPr lang="en-US"/>
           </a:p>
@@ -1881,7 +1882,7 @@
             <a:fld id="{1D8BD707-D9CF-40AE-B4C6-C98DA3205C09}" type="datetimeFigureOut">
               <a:rPr lang="en-US" smtClean="0"/>
               <a:pPr/>
-              <a:t>7/3/2018</a:t>
+              <a:t>10/14/2020</a:t>
             </a:fld>
             <a:endParaRPr lang="en-US"/>
           </a:p>
@@ -1973,7 +1974,7 @@
             <a:fld id="{1D8BD707-D9CF-40AE-B4C6-C98DA3205C09}" type="datetimeFigureOut">
               <a:rPr lang="en-US" smtClean="0"/>
               <a:pPr/>
-              <a:t>7/3/2018</a:t>
+              <a:t>10/14/2020</a:t>
             </a:fld>
             <a:endParaRPr lang="en-US"/>
           </a:p>
@@ -2247,7 +2248,7 @@
             <a:fld id="{1D8BD707-D9CF-40AE-B4C6-C98DA3205C09}" type="datetimeFigureOut">
               <a:rPr lang="en-US" smtClean="0"/>
               <a:pPr/>
-              <a:t>7/3/2018</a:t>
+              <a:t>10/14/2020</a:t>
             </a:fld>
             <a:endParaRPr lang="en-US"/>
           </a:p>
@@ -2497,7 +2498,7 @@
             <a:fld id="{1D8BD707-D9CF-40AE-B4C6-C98DA3205C09}" type="datetimeFigureOut">
               <a:rPr lang="en-US" smtClean="0"/>
               <a:pPr/>
-              <a:t>7/3/2018</a:t>
+              <a:t>10/14/2020</a:t>
             </a:fld>
             <a:endParaRPr lang="en-US"/>
           </a:p>
@@ -2707,7 +2708,7 @@
             <a:fld id="{1D8BD707-D9CF-40AE-B4C6-C98DA3205C09}" type="datetimeFigureOut">
               <a:rPr lang="en-US" smtClean="0"/>
               <a:pPr/>
-              <a:t>7/3/2018</a:t>
+              <a:t>10/14/2020</a:t>
             </a:fld>
             <a:endParaRPr lang="en-US"/>
           </a:p>
@@ -4266,256 +4267,378 @@
       </p:grpSpPr>
       <p:sp>
         <p:nvSpPr>
-          <p:cNvPr id="2" name="Title 1"/>
-          <p:cNvSpPr>
-            <a:spLocks noGrp="1"/>
-          </p:cNvSpPr>
-          <p:nvPr>
-            <p:ph type="title"/>
-          </p:nvPr>
-        </p:nvSpPr>
-        <p:spPr/>
-        <p:txBody>
-          <a:bodyPr/>
+          <p:cNvPr id="4" name="Rectangle 3"/>
+          <p:cNvSpPr/>
+          <p:nvPr/>
+        </p:nvSpPr>
+        <p:spPr>
+          <a:xfrm>
+            <a:off x="457200" y="1143000"/>
+            <a:ext cx="3276600" cy="1524000"/>
+          </a:xfrm>
+          <a:prstGeom prst="rect">
+            <a:avLst/>
+          </a:prstGeom>
+        </p:spPr>
+        <p:style>
+          <a:lnRef idx="2">
+            <a:schemeClr val="accent1">
+              <a:shade val="50000"/>
+            </a:schemeClr>
+          </a:lnRef>
+          <a:fillRef idx="1">
+            <a:schemeClr val="accent1"/>
+          </a:fillRef>
+          <a:effectRef idx="0">
+            <a:schemeClr val="accent1"/>
+          </a:effectRef>
+          <a:fontRef idx="minor">
+            <a:schemeClr val="lt1"/>
+          </a:fontRef>
+        </p:style>
+        <p:txBody>
+          <a:bodyPr rtlCol="0" anchor="ctr"/>
           <a:lstStyle/>
           <a:p>
-            <a:r>
-              <a:rPr lang="en-US" dirty="0" err="1" smtClean="0"/>
-              <a:t>Khác</a:t>
-            </a:r>
-            <a:r>
-              <a:rPr lang="en-US" dirty="0" smtClean="0"/>
-              <a:t> </a:t>
-            </a:r>
-            <a:r>
-              <a:rPr lang="en-US" dirty="0" err="1" smtClean="0"/>
-              <a:t>nhau</a:t>
-            </a:r>
-            <a:r>
-              <a:rPr lang="en-US" dirty="0" smtClean="0"/>
-              <a:t> (1)</a:t>
-            </a:r>
-            <a:endParaRPr lang="en-US" dirty="0"/>
-          </a:p>
-        </p:txBody>
-      </p:sp>
-      <p:sp>
-        <p:nvSpPr>
-          <p:cNvPr id="3" name="Content Placeholder 2"/>
-          <p:cNvSpPr>
-            <a:spLocks noGrp="1"/>
-          </p:cNvSpPr>
-          <p:nvPr>
-            <p:ph idx="1"/>
-          </p:nvPr>
-        </p:nvSpPr>
-        <p:spPr/>
-        <p:txBody>
-          <a:bodyPr/>
+            <a:pPr algn="ctr"/>
+            <a:r>
+              <a:rPr lang="en-US" sz="2400" dirty="0" smtClean="0"/>
+              <a:t>Interface</a:t>
+            </a:r>
+            <a:endParaRPr lang="en-US" sz="2400" dirty="0"/>
+          </a:p>
+        </p:txBody>
+      </p:sp>
+      <p:sp>
+        <p:nvSpPr>
+          <p:cNvPr id="5" name="Rectangle 4"/>
+          <p:cNvSpPr/>
+          <p:nvPr/>
+        </p:nvSpPr>
+        <p:spPr>
+          <a:xfrm>
+            <a:off x="533400" y="4114800"/>
+            <a:ext cx="3276600" cy="1524000"/>
+          </a:xfrm>
+          <a:prstGeom prst="rect">
+            <a:avLst/>
+          </a:prstGeom>
+        </p:spPr>
+        <p:style>
+          <a:lnRef idx="2">
+            <a:schemeClr val="accent1">
+              <a:shade val="50000"/>
+            </a:schemeClr>
+          </a:lnRef>
+          <a:fillRef idx="1">
+            <a:schemeClr val="accent1"/>
+          </a:fillRef>
+          <a:effectRef idx="0">
+            <a:schemeClr val="accent1"/>
+          </a:effectRef>
+          <a:fontRef idx="minor">
+            <a:schemeClr val="lt1"/>
+          </a:fontRef>
+        </p:style>
+        <p:txBody>
+          <a:bodyPr rtlCol="0" anchor="ctr"/>
           <a:lstStyle/>
           <a:p>
-            <a:r>
-              <a:rPr lang="en-US" dirty="0" smtClean="0"/>
-              <a:t>Constructor</a:t>
-            </a:r>
-          </a:p>
-          <a:p>
-            <a:pPr lvl="1"/>
-            <a:r>
-              <a:rPr lang="en-US" dirty="0" smtClean="0"/>
-              <a:t>Abstract Class constructor </a:t>
-            </a:r>
-            <a:r>
-              <a:rPr lang="en-US" dirty="0" err="1" smtClean="0"/>
-              <a:t>mặc</a:t>
-            </a:r>
-            <a:r>
-              <a:rPr lang="en-US" dirty="0" smtClean="0"/>
-              <a:t> </a:t>
-            </a:r>
-            <a:r>
-              <a:rPr lang="en-US" dirty="0" err="1" smtClean="0"/>
-              <a:t>định</a:t>
-            </a:r>
-            <a:endParaRPr lang="en-US" dirty="0" smtClean="0"/>
-          </a:p>
-          <a:p>
-            <a:pPr lvl="1"/>
-            <a:r>
-              <a:rPr lang="en-US" dirty="0" smtClean="0"/>
-              <a:t>Interface </a:t>
-            </a:r>
-            <a:r>
-              <a:rPr lang="en-US" dirty="0" err="1" smtClean="0"/>
-              <a:t>không</a:t>
-            </a:r>
-            <a:r>
-              <a:rPr lang="en-US" dirty="0" smtClean="0"/>
-              <a:t> </a:t>
-            </a:r>
-            <a:r>
-              <a:rPr lang="en-US" dirty="0" err="1" smtClean="0"/>
-              <a:t>có</a:t>
-            </a:r>
-            <a:r>
-              <a:rPr lang="en-US" dirty="0" smtClean="0"/>
-              <a:t> constructor </a:t>
-            </a:r>
-            <a:r>
-              <a:rPr lang="en-US" dirty="0" err="1" smtClean="0"/>
-              <a:t>mặc</a:t>
-            </a:r>
-            <a:r>
-              <a:rPr lang="en-US" dirty="0" smtClean="0"/>
-              <a:t> </a:t>
-            </a:r>
-            <a:r>
-              <a:rPr lang="en-US" dirty="0" err="1" smtClean="0"/>
-              <a:t>định</a:t>
-            </a:r>
-            <a:endParaRPr lang="en-US" dirty="0" smtClean="0"/>
-          </a:p>
-          <a:p>
-            <a:r>
-              <a:rPr lang="en-US" dirty="0" err="1" smtClean="0"/>
-              <a:t>Biến</a:t>
-            </a:r>
-            <a:endParaRPr lang="en-US" dirty="0"/>
-          </a:p>
-          <a:p>
-            <a:pPr lvl="1"/>
-            <a:r>
-              <a:rPr lang="en-US" dirty="0"/>
-              <a:t>Abstract </a:t>
-            </a:r>
-            <a:r>
-              <a:rPr lang="en-US" dirty="0" smtClean="0"/>
-              <a:t>Class </a:t>
-            </a:r>
-            <a:r>
-              <a:rPr lang="en-US" dirty="0" err="1" smtClean="0"/>
-              <a:t>có</a:t>
-            </a:r>
-            <a:r>
-              <a:rPr lang="en-US" dirty="0" smtClean="0"/>
-              <a:t> </a:t>
-            </a:r>
-            <a:r>
-              <a:rPr lang="en-US" dirty="0" err="1" smtClean="0"/>
-              <a:t>giá</a:t>
-            </a:r>
-            <a:r>
-              <a:rPr lang="en-US" dirty="0" smtClean="0"/>
-              <a:t> </a:t>
-            </a:r>
-            <a:r>
-              <a:rPr lang="en-US" dirty="0" err="1" smtClean="0"/>
-              <a:t>trị</a:t>
-            </a:r>
-            <a:r>
-              <a:rPr lang="en-US" dirty="0" smtClean="0"/>
-              <a:t> </a:t>
-            </a:r>
-            <a:r>
-              <a:rPr lang="en-US" dirty="0" err="1" smtClean="0"/>
-              <a:t>mặc</a:t>
-            </a:r>
-            <a:r>
-              <a:rPr lang="en-US" dirty="0" smtClean="0"/>
-              <a:t> </a:t>
-            </a:r>
-            <a:r>
-              <a:rPr lang="en-US" dirty="0" err="1" smtClean="0"/>
-              <a:t>định</a:t>
-            </a:r>
-            <a:endParaRPr lang="en-US" dirty="0" smtClean="0"/>
-          </a:p>
-          <a:p>
-            <a:pPr lvl="1"/>
-            <a:r>
-              <a:rPr lang="en-US" dirty="0" smtClean="0"/>
-              <a:t>Interface </a:t>
-            </a:r>
-            <a:r>
-              <a:rPr lang="en-US" dirty="0" err="1" smtClean="0"/>
-              <a:t>không</a:t>
-            </a:r>
-            <a:r>
-              <a:rPr lang="en-US" dirty="0" smtClean="0"/>
-              <a:t> </a:t>
-            </a:r>
-            <a:r>
-              <a:rPr lang="en-US" dirty="0" err="1" smtClean="0"/>
-              <a:t>có</a:t>
-            </a:r>
-            <a:r>
-              <a:rPr lang="en-US" dirty="0" smtClean="0"/>
-              <a:t> </a:t>
-            </a:r>
-            <a:r>
-              <a:rPr lang="en-US" dirty="0" err="1" smtClean="0"/>
-              <a:t>giá</a:t>
-            </a:r>
-            <a:r>
-              <a:rPr lang="en-US" dirty="0" smtClean="0"/>
-              <a:t> </a:t>
-            </a:r>
-            <a:r>
-              <a:rPr lang="en-US" dirty="0" err="1" smtClean="0"/>
-              <a:t>trị</a:t>
-            </a:r>
-            <a:r>
-              <a:rPr lang="en-US" dirty="0" smtClean="0"/>
-              <a:t> </a:t>
-            </a:r>
-            <a:r>
-              <a:rPr lang="en-US" dirty="0" err="1" smtClean="0"/>
-              <a:t>mặc</a:t>
-            </a:r>
-            <a:r>
-              <a:rPr lang="en-US" dirty="0" smtClean="0"/>
-              <a:t> </a:t>
-            </a:r>
-            <a:r>
-              <a:rPr lang="en-US" dirty="0" err="1" smtClean="0"/>
-              <a:t>định</a:t>
-            </a:r>
-            <a:r>
-              <a:rPr lang="en-US" dirty="0" smtClean="0"/>
-              <a:t>, </a:t>
-            </a:r>
-            <a:r>
-              <a:rPr lang="en-US" dirty="0" err="1" smtClean="0"/>
-              <a:t>biến</a:t>
-            </a:r>
-            <a:r>
-              <a:rPr lang="en-US" dirty="0" smtClean="0"/>
-              <a:t> ở </a:t>
-            </a:r>
-            <a:r>
-              <a:rPr lang="en-US" dirty="0" err="1" smtClean="0"/>
-              <a:t>dạng</a:t>
-            </a:r>
-            <a:r>
-              <a:rPr lang="en-US" dirty="0" smtClean="0"/>
-              <a:t> static final </a:t>
-            </a:r>
-            <a:r>
-              <a:rPr lang="en-US" dirty="0" err="1" smtClean="0"/>
-              <a:t>khi</a:t>
-            </a:r>
-            <a:r>
-              <a:rPr lang="en-US" dirty="0" smtClean="0"/>
-              <a:t> compiler</a:t>
-            </a:r>
-            <a:endParaRPr lang="en-US" dirty="0"/>
+            <a:pPr algn="ctr"/>
+            <a:r>
+              <a:rPr lang="en-US" sz="2400" dirty="0" smtClean="0"/>
+              <a:t>Interface</a:t>
+            </a:r>
+            <a:endParaRPr lang="en-US" sz="2400" dirty="0"/>
+          </a:p>
+        </p:txBody>
+      </p:sp>
+      <p:sp>
+        <p:nvSpPr>
+          <p:cNvPr id="6" name="Rectangle 5"/>
+          <p:cNvSpPr/>
+          <p:nvPr/>
+        </p:nvSpPr>
+        <p:spPr>
+          <a:xfrm>
+            <a:off x="5715000" y="1115961"/>
+            <a:ext cx="3276600" cy="1524000"/>
+          </a:xfrm>
+          <a:prstGeom prst="rect">
+            <a:avLst/>
+          </a:prstGeom>
+        </p:spPr>
+        <p:style>
+          <a:lnRef idx="2">
+            <a:schemeClr val="accent1">
+              <a:shade val="50000"/>
+            </a:schemeClr>
+          </a:lnRef>
+          <a:fillRef idx="1">
+            <a:schemeClr val="accent1"/>
+          </a:fillRef>
+          <a:effectRef idx="0">
+            <a:schemeClr val="accent1"/>
+          </a:effectRef>
+          <a:fontRef idx="minor">
+            <a:schemeClr val="lt1"/>
+          </a:fontRef>
+        </p:style>
+        <p:txBody>
+          <a:bodyPr rtlCol="0" anchor="ctr"/>
+          <a:lstStyle/>
+          <a:p>
+            <a:pPr algn="ctr"/>
+            <a:r>
+              <a:rPr lang="en-US" sz="2400" dirty="0" smtClean="0"/>
+              <a:t>Class</a:t>
+            </a:r>
+            <a:endParaRPr lang="en-US" sz="2400" dirty="0"/>
+          </a:p>
+        </p:txBody>
+      </p:sp>
+      <p:sp>
+        <p:nvSpPr>
+          <p:cNvPr id="7" name="Rectangle 6"/>
+          <p:cNvSpPr/>
+          <p:nvPr/>
+        </p:nvSpPr>
+        <p:spPr>
+          <a:xfrm>
+            <a:off x="5638800" y="4038600"/>
+            <a:ext cx="3276600" cy="1524000"/>
+          </a:xfrm>
+          <a:prstGeom prst="rect">
+            <a:avLst/>
+          </a:prstGeom>
+        </p:spPr>
+        <p:style>
+          <a:lnRef idx="2">
+            <a:schemeClr val="accent1">
+              <a:shade val="50000"/>
+            </a:schemeClr>
+          </a:lnRef>
+          <a:fillRef idx="1">
+            <a:schemeClr val="accent1"/>
+          </a:fillRef>
+          <a:effectRef idx="0">
+            <a:schemeClr val="accent1"/>
+          </a:effectRef>
+          <a:fontRef idx="minor">
+            <a:schemeClr val="lt1"/>
+          </a:fontRef>
+        </p:style>
+        <p:txBody>
+          <a:bodyPr rtlCol="0" anchor="ctr"/>
+          <a:lstStyle/>
+          <a:p>
+            <a:pPr algn="ctr"/>
+            <a:r>
+              <a:rPr lang="en-US" sz="2400" dirty="0" smtClean="0"/>
+              <a:t>Class</a:t>
+            </a:r>
+            <a:endParaRPr lang="en-US" sz="2400" dirty="0"/>
+          </a:p>
+        </p:txBody>
+      </p:sp>
+      <p:sp>
+        <p:nvSpPr>
+          <p:cNvPr id="11" name="Down Arrow 10"/>
+          <p:cNvSpPr/>
+          <p:nvPr/>
+        </p:nvSpPr>
+        <p:spPr>
+          <a:xfrm>
+            <a:off x="6248400" y="2667000"/>
+            <a:ext cx="2590800" cy="1371600"/>
+          </a:xfrm>
+          <a:prstGeom prst="downArrow">
+            <a:avLst/>
+          </a:prstGeom>
+        </p:spPr>
+        <p:style>
+          <a:lnRef idx="2">
+            <a:schemeClr val="accent1">
+              <a:shade val="50000"/>
+            </a:schemeClr>
+          </a:lnRef>
+          <a:fillRef idx="1">
+            <a:schemeClr val="accent1"/>
+          </a:fillRef>
+          <a:effectRef idx="0">
+            <a:schemeClr val="accent1"/>
+          </a:effectRef>
+          <a:fontRef idx="minor">
+            <a:schemeClr val="lt1"/>
+          </a:fontRef>
+        </p:style>
+        <p:txBody>
+          <a:bodyPr rtlCol="0" anchor="ctr"/>
+          <a:lstStyle/>
+          <a:p>
+            <a:pPr algn="ctr"/>
+            <a:r>
+              <a:rPr lang="en-US" sz="2400" dirty="0" smtClean="0"/>
+              <a:t>Extends</a:t>
+            </a:r>
+            <a:endParaRPr lang="en-US" sz="2400" dirty="0"/>
+          </a:p>
+        </p:txBody>
+      </p:sp>
+      <p:sp>
+        <p:nvSpPr>
+          <p:cNvPr id="14" name="Down Arrow 13"/>
+          <p:cNvSpPr/>
+          <p:nvPr/>
+        </p:nvSpPr>
+        <p:spPr>
+          <a:xfrm>
+            <a:off x="838200" y="2686665"/>
+            <a:ext cx="2514600" cy="1371600"/>
+          </a:xfrm>
+          <a:prstGeom prst="downArrow">
+            <a:avLst/>
+          </a:prstGeom>
+        </p:spPr>
+        <p:style>
+          <a:lnRef idx="2">
+            <a:schemeClr val="accent1">
+              <a:shade val="50000"/>
+            </a:schemeClr>
+          </a:lnRef>
+          <a:fillRef idx="1">
+            <a:schemeClr val="accent1"/>
+          </a:fillRef>
+          <a:effectRef idx="0">
+            <a:schemeClr val="accent1"/>
+          </a:effectRef>
+          <a:fontRef idx="minor">
+            <a:schemeClr val="lt1"/>
+          </a:fontRef>
+        </p:style>
+        <p:txBody>
+          <a:bodyPr rtlCol="0" anchor="ctr"/>
+          <a:lstStyle/>
+          <a:p>
+            <a:pPr algn="ctr"/>
+            <a:r>
+              <a:rPr lang="en-US" sz="2400" dirty="0" smtClean="0"/>
+              <a:t>Extends</a:t>
+            </a:r>
+            <a:endParaRPr lang="en-US" sz="2400" dirty="0"/>
+          </a:p>
+        </p:txBody>
+      </p:sp>
+      <p:sp>
+        <p:nvSpPr>
+          <p:cNvPr id="15" name="Right Arrow 14"/>
+          <p:cNvSpPr/>
+          <p:nvPr/>
+        </p:nvSpPr>
+        <p:spPr>
+          <a:xfrm>
+            <a:off x="3810000" y="4114800"/>
+            <a:ext cx="1828800" cy="1143000"/>
+          </a:xfrm>
+          <a:prstGeom prst="rightArrow">
+            <a:avLst/>
+          </a:prstGeom>
+        </p:spPr>
+        <p:style>
+          <a:lnRef idx="2">
+            <a:schemeClr val="accent1">
+              <a:shade val="50000"/>
+            </a:schemeClr>
+          </a:lnRef>
+          <a:fillRef idx="1">
+            <a:schemeClr val="accent1"/>
+          </a:fillRef>
+          <a:effectRef idx="0">
+            <a:schemeClr val="accent1"/>
+          </a:effectRef>
+          <a:fontRef idx="minor">
+            <a:schemeClr val="lt1"/>
+          </a:fontRef>
+        </p:style>
+        <p:txBody>
+          <a:bodyPr rtlCol="0" anchor="ctr"/>
+          <a:lstStyle/>
+          <a:p>
+            <a:pPr algn="ctr"/>
+            <a:r>
+              <a:rPr lang="en-US" sz="2400" dirty="0" smtClean="0"/>
+              <a:t>Implement</a:t>
+            </a:r>
+            <a:endParaRPr lang="en-US" sz="2400" dirty="0"/>
+          </a:p>
+        </p:txBody>
+      </p:sp>
+      <p:sp>
+        <p:nvSpPr>
+          <p:cNvPr id="18" name="TextBox 17"/>
+          <p:cNvSpPr txBox="1"/>
+          <p:nvPr/>
+        </p:nvSpPr>
+        <p:spPr>
+          <a:xfrm>
+            <a:off x="2514600" y="6096000"/>
+            <a:ext cx="4091313" cy="461665"/>
+          </a:xfrm>
+          <a:prstGeom prst="rect">
+            <a:avLst/>
+          </a:prstGeom>
+          <a:noFill/>
+        </p:spPr>
+        <p:txBody>
+          <a:bodyPr wrap="none" rtlCol="0">
+            <a:spAutoFit/>
+          </a:bodyPr>
+          <a:lstStyle/>
+          <a:p>
+            <a:r>
+              <a:rPr lang="en-US" sz="2400" dirty="0" err="1" smtClean="0"/>
+              <a:t>Kế</a:t>
+            </a:r>
+            <a:r>
+              <a:rPr lang="en-US" sz="2400" dirty="0" smtClean="0"/>
+              <a:t> </a:t>
+            </a:r>
+            <a:r>
+              <a:rPr lang="en-US" sz="2400" dirty="0" err="1" smtClean="0"/>
+              <a:t>thừa</a:t>
+            </a:r>
+            <a:r>
+              <a:rPr lang="en-US" sz="2400" dirty="0" smtClean="0"/>
+              <a:t> </a:t>
+            </a:r>
+            <a:r>
+              <a:rPr lang="en-US" sz="2400" dirty="0" err="1" smtClean="0"/>
+              <a:t>giữa</a:t>
+            </a:r>
+            <a:r>
+              <a:rPr lang="en-US" sz="2400" dirty="0" smtClean="0"/>
+              <a:t> Interface </a:t>
+            </a:r>
+            <a:r>
+              <a:rPr lang="en-US" sz="2400" dirty="0" err="1" smtClean="0"/>
+              <a:t>và</a:t>
+            </a:r>
+            <a:r>
+              <a:rPr lang="en-US" sz="2400" dirty="0" smtClean="0"/>
+              <a:t> </a:t>
+            </a:r>
+            <a:r>
+              <a:rPr lang="en-US" sz="2400" dirty="0" err="1" smtClean="0"/>
+              <a:t>classs</a:t>
+            </a:r>
+            <a:endParaRPr lang="en-US" sz="2400" dirty="0"/>
           </a:p>
         </p:txBody>
       </p:sp>
     </p:spTree>
     <p:extLst>
       <p:ext uri="{BB962C8B-B14F-4D97-AF65-F5344CB8AC3E}">
-        <p14:creationId xmlns:p14="http://schemas.microsoft.com/office/powerpoint/2010/main" val="1416552654"/>
+        <p14:creationId xmlns:p14="http://schemas.microsoft.com/office/powerpoint/2010/main" val="1560661888"/>
       </p:ext>
     </p:extLst>
   </p:cSld>
@@ -4571,7 +4694,7 @@
             </a:r>
             <a:r>
               <a:rPr lang="en-US" dirty="0" smtClean="0"/>
-              <a:t> (2)</a:t>
+              <a:t> (1)</a:t>
             </a:r>
             <a:endParaRPr lang="en-US" dirty="0"/>
           </a:p>
@@ -4594,66 +4717,26 @@
           <a:p>
             <a:r>
               <a:rPr lang="en-US" dirty="0" smtClean="0"/>
-              <a:t>Abstract method</a:t>
+              <a:t>Constructor</a:t>
             </a:r>
           </a:p>
           <a:p>
             <a:pPr lvl="1"/>
             <a:r>
               <a:rPr lang="en-US" dirty="0" smtClean="0"/>
-              <a:t>Abstract </a:t>
-            </a:r>
-            <a:r>
-              <a:rPr lang="en-US" dirty="0"/>
-              <a:t>class </a:t>
-            </a:r>
-            <a:r>
-              <a:rPr lang="en-US" dirty="0" err="1" smtClean="0"/>
-              <a:t>Có</a:t>
-            </a:r>
-            <a:r>
-              <a:rPr lang="en-US" dirty="0" smtClean="0"/>
-              <a:t> </a:t>
-            </a:r>
-            <a:r>
-              <a:rPr lang="en-US" dirty="0" err="1" smtClean="0"/>
-              <a:t>thể</a:t>
-            </a:r>
-            <a:r>
-              <a:rPr lang="en-US" dirty="0" smtClean="0"/>
-              <a:t> </a:t>
-            </a:r>
-            <a:r>
-              <a:rPr lang="en-US" dirty="0" err="1" smtClean="0"/>
-              <a:t>thực</a:t>
-            </a:r>
-            <a:r>
-              <a:rPr lang="en-US" dirty="0" smtClean="0"/>
-              <a:t> </a:t>
-            </a:r>
-            <a:r>
-              <a:rPr lang="en-US" dirty="0" err="1" smtClean="0"/>
-              <a:t>hiện</a:t>
-            </a:r>
-            <a:r>
-              <a:rPr lang="en-US" dirty="0" smtClean="0"/>
-              <a:t> chi </a:t>
-            </a:r>
-            <a:r>
-              <a:rPr lang="en-US" dirty="0" err="1" smtClean="0"/>
-              <a:t>tiết</a:t>
-            </a:r>
-            <a:r>
-              <a:rPr lang="en-US" dirty="0"/>
-              <a:t> </a:t>
-            </a:r>
-            <a:r>
-              <a:rPr lang="en-US" dirty="0" smtClean="0"/>
-              <a:t>ở </a:t>
-            </a:r>
-            <a:r>
-              <a:rPr lang="en-US" dirty="0" err="1" smtClean="0"/>
-              <a:t>trong</a:t>
+              <a:t>Abstract Class constructor </a:t>
+            </a:r>
+            <a:r>
+              <a:rPr lang="en-US" dirty="0" err="1" smtClean="0"/>
+              <a:t>mặc</a:t>
+            </a:r>
+            <a:r>
+              <a:rPr lang="en-US" dirty="0" smtClean="0"/>
+              <a:t> </a:t>
+            </a:r>
+            <a:r>
+              <a:rPr lang="en-US" dirty="0" err="1" smtClean="0"/>
+              <a:t>định</a:t>
             </a:r>
             <a:endParaRPr lang="en-US" dirty="0" smtClean="0"/>
           </a:p>
@@ -4665,65 +4748,126 @@
             </a:r>
             <a:r>
               <a:rPr lang="en-US" dirty="0" err="1" smtClean="0"/>
-              <a:t>Không</a:t>
-            </a:r>
-            <a:r>
-              <a:rPr lang="en-US" dirty="0" smtClean="0"/>
-              <a:t> </a:t>
-            </a:r>
-            <a:r>
-              <a:rPr lang="en-US" dirty="0" err="1" smtClean="0"/>
-              <a:t>thực</a:t>
-            </a:r>
-            <a:r>
-              <a:rPr lang="en-US" dirty="0" smtClean="0"/>
-              <a:t> </a:t>
-            </a:r>
-            <a:r>
-              <a:rPr lang="en-US" dirty="0" err="1" smtClean="0"/>
-              <a:t>hiện</a:t>
-            </a:r>
-            <a:r>
-              <a:rPr lang="en-US" dirty="0" smtClean="0"/>
-              <a:t> chi </a:t>
-            </a:r>
-            <a:r>
-              <a:rPr lang="en-US" dirty="0" err="1" smtClean="0"/>
-              <a:t>tiết</a:t>
+              <a:t>không</a:t>
+            </a:r>
+            <a:r>
+              <a:rPr lang="en-US" dirty="0" smtClean="0"/>
+              <a:t> </a:t>
+            </a:r>
+            <a:r>
+              <a:rPr lang="en-US" dirty="0" err="1" smtClean="0"/>
+              <a:t>có</a:t>
+            </a:r>
+            <a:r>
+              <a:rPr lang="en-US" dirty="0" smtClean="0"/>
+              <a:t> constructor </a:t>
+            </a:r>
+            <a:r>
+              <a:rPr lang="en-US" dirty="0" err="1" smtClean="0"/>
+              <a:t>mặc</a:t>
+            </a:r>
+            <a:r>
+              <a:rPr lang="en-US" dirty="0" smtClean="0"/>
+              <a:t> </a:t>
+            </a:r>
+            <a:r>
+              <a:rPr lang="en-US" dirty="0" err="1" smtClean="0"/>
+              <a:t>định</a:t>
             </a:r>
             <a:endParaRPr lang="en-US" dirty="0" smtClean="0"/>
           </a:p>
           <a:p>
             <a:r>
-              <a:rPr lang="en-US" dirty="0" smtClean="0"/>
-              <a:t>Access modifier </a:t>
-            </a:r>
-            <a:r>
-              <a:rPr lang="en-US" dirty="0" err="1" smtClean="0"/>
-              <a:t>của</a:t>
-            </a:r>
-            <a:r>
-              <a:rPr lang="en-US" dirty="0" smtClean="0"/>
-              <a:t> </a:t>
-            </a:r>
+              <a:rPr lang="en-US" dirty="0" err="1" smtClean="0"/>
+              <a:t>Biến</a:t>
+            </a:r>
+            <a:endParaRPr lang="en-US" dirty="0"/>
+          </a:p>
+          <a:p>
+            <a:pPr lvl="1"/>
             <a:r>
               <a:rPr lang="en-US" dirty="0"/>
               <a:t>Abstract </a:t>
             </a:r>
             <a:r>
               <a:rPr lang="en-US" dirty="0" smtClean="0"/>
-              <a:t>method</a:t>
-            </a:r>
+              <a:t>Class </a:t>
+            </a:r>
+            <a:r>
+              <a:rPr lang="en-US" dirty="0" err="1" smtClean="0"/>
+              <a:t>có</a:t>
+            </a:r>
+            <a:r>
+              <a:rPr lang="en-US" dirty="0" smtClean="0"/>
+              <a:t> </a:t>
+            </a:r>
+            <a:r>
+              <a:rPr lang="en-US" dirty="0" err="1" smtClean="0"/>
+              <a:t>giá</a:t>
+            </a:r>
+            <a:r>
+              <a:rPr lang="en-US" dirty="0" smtClean="0"/>
+              <a:t> </a:t>
+            </a:r>
+            <a:r>
+              <a:rPr lang="en-US" dirty="0" err="1" smtClean="0"/>
+              <a:t>trị</a:t>
+            </a:r>
+            <a:r>
+              <a:rPr lang="en-US" dirty="0" smtClean="0"/>
+              <a:t> </a:t>
+            </a:r>
+            <a:r>
+              <a:rPr lang="en-US" dirty="0" err="1" smtClean="0"/>
+              <a:t>mặc</a:t>
+            </a:r>
+            <a:r>
+              <a:rPr lang="en-US" dirty="0" smtClean="0"/>
+              <a:t> </a:t>
+            </a:r>
+            <a:r>
+              <a:rPr lang="en-US" dirty="0" err="1" smtClean="0"/>
+              <a:t>định</a:t>
+            </a:r>
+            <a:endParaRPr lang="en-US" dirty="0" smtClean="0"/>
           </a:p>
           <a:p>
             <a:pPr lvl="1"/>
             <a:r>
-              <a:rPr lang="en-US" dirty="0"/>
-              <a:t>Abstract </a:t>
-            </a:r>
-            <a:r>
-              <a:rPr lang="en-US" dirty="0" smtClean="0"/>
-              <a:t>class: Access modifier: </a:t>
+              <a:rPr lang="en-US" dirty="0" smtClean="0"/>
+              <a:t>Interface </a:t>
+            </a:r>
+            <a:r>
+              <a:rPr lang="en-US" dirty="0" err="1" smtClean="0"/>
+              <a:t>không</a:t>
+            </a:r>
+            <a:r>
+              <a:rPr lang="en-US" dirty="0" smtClean="0"/>
+              <a:t> </a:t>
+            </a:r>
+            <a:r>
+              <a:rPr lang="en-US" dirty="0" err="1" smtClean="0"/>
+              <a:t>có</a:t>
+            </a:r>
+            <a:r>
+              <a:rPr lang="en-US" dirty="0" smtClean="0"/>
+              <a:t> </a:t>
+            </a:r>
+            <a:r>
+              <a:rPr lang="en-US" dirty="0" err="1" smtClean="0"/>
+              <a:t>giá</a:t>
+            </a:r>
+            <a:r>
+              <a:rPr lang="en-US" dirty="0" smtClean="0"/>
+              <a:t> </a:t>
+            </a:r>
+            <a:r>
+              <a:rPr lang="en-US" dirty="0" err="1" smtClean="0"/>
+              <a:t>trị</a:t>
+            </a:r>
+            <a:r>
+              <a:rPr lang="en-US" dirty="0" smtClean="0"/>
+              <a:t> </a:t>
             </a:r>
             <a:r>
               <a:rPr lang="en-US" dirty="0" err="1" smtClean="0"/>
@@ -4739,46 +4883,23 @@
             </a:r>
             <a:r>
               <a:rPr lang="en-US" dirty="0" smtClean="0"/>
-              <a:t>, protected, public</a:t>
-            </a:r>
-          </a:p>
-          <a:p>
-            <a:pPr lvl="1"/>
-            <a:r>
-              <a:rPr lang="en-US" dirty="0" smtClean="0"/>
-              <a:t>Interface: </a:t>
-            </a:r>
-            <a:r>
-              <a:rPr lang="en-US" dirty="0" err="1" smtClean="0"/>
-              <a:t>chỉ</a:t>
-            </a:r>
-            <a:r>
-              <a:rPr lang="en-US" dirty="0" smtClean="0"/>
-              <a:t> </a:t>
-            </a:r>
-            <a:r>
-              <a:rPr lang="en-US" dirty="0" err="1" smtClean="0"/>
-              <a:t>có</a:t>
-            </a:r>
-            <a:r>
-              <a:rPr lang="en-US" dirty="0" smtClean="0"/>
-              <a:t> </a:t>
-            </a:r>
-            <a:r>
-              <a:rPr lang="en-US" dirty="0" err="1" smtClean="0"/>
-              <a:t>thể</a:t>
-            </a:r>
-            <a:r>
-              <a:rPr lang="en-US" dirty="0" smtClean="0"/>
-              <a:t> </a:t>
-            </a:r>
-            <a:r>
-              <a:rPr lang="en-US" dirty="0" err="1" smtClean="0"/>
-              <a:t>là</a:t>
-            </a:r>
-            <a:r>
-              <a:rPr lang="en-US" dirty="0" smtClean="0"/>
-              <a:t> public (</a:t>
+              <a:t>, </a:t>
+            </a:r>
+            <a:r>
+              <a:rPr lang="en-US" dirty="0" err="1" smtClean="0"/>
+              <a:t>biến</a:t>
+            </a:r>
+            <a:r>
+              <a:rPr lang="en-US" dirty="0" smtClean="0"/>
+              <a:t> ở </a:t>
+            </a:r>
+            <a:r>
+              <a:rPr lang="en-US" dirty="0" err="1" smtClean="0"/>
+              <a:t>dạng</a:t>
+            </a:r>
+            <a:r>
+              <a:rPr lang="en-US" dirty="0" smtClean="0"/>
+              <a:t> static final </a:t>
             </a:r>
             <a:r>
               <a:rPr lang="en-US" dirty="0" err="1" smtClean="0"/>
@@ -4786,36 +4907,8 @@
             </a:r>
             <a:r>
               <a:rPr lang="en-US" dirty="0" smtClean="0"/>
-              <a:t> compiler </a:t>
-            </a:r>
-            <a:r>
-              <a:rPr lang="en-US" dirty="0" err="1" smtClean="0"/>
-              <a:t>mặc</a:t>
-            </a:r>
-            <a:r>
-              <a:rPr lang="en-US" dirty="0" smtClean="0"/>
-              <a:t> </a:t>
-            </a:r>
-            <a:r>
-              <a:rPr lang="en-US" dirty="0" err="1" smtClean="0"/>
-              <a:t>định</a:t>
-            </a:r>
-            <a:r>
-              <a:rPr lang="en-US" dirty="0" smtClean="0"/>
-              <a:t> </a:t>
-            </a:r>
-            <a:r>
-              <a:rPr lang="en-US" dirty="0" err="1" smtClean="0"/>
-              <a:t>là</a:t>
-            </a:r>
-            <a:r>
-              <a:rPr lang="en-US" dirty="0" smtClean="0"/>
-              <a:t> public)</a:t>
-            </a:r>
-            <a:endParaRPr lang="en-US" dirty="0" smtClean="0"/>
-          </a:p>
-          <a:p>
-            <a:pPr lvl="1"/>
+              <a:t> compiler</a:t>
+            </a:r>
             <a:endParaRPr lang="en-US" dirty="0"/>
           </a:p>
         </p:txBody>
@@ -4823,7 +4916,7 @@
     </p:spTree>
     <p:extLst>
       <p:ext uri="{BB962C8B-B14F-4D97-AF65-F5344CB8AC3E}">
-        <p14:creationId xmlns:p14="http://schemas.microsoft.com/office/powerpoint/2010/main" val="2452286896"/>
+        <p14:creationId xmlns:p14="http://schemas.microsoft.com/office/powerpoint/2010/main" val="1416552654"/>
       </p:ext>
     </p:extLst>
   </p:cSld>
@@ -4879,7 +4972,7 @@
             </a:r>
             <a:r>
               <a:rPr lang="en-US" dirty="0" smtClean="0"/>
-              <a:t> (3)</a:t>
+              <a:t> (2)</a:t>
             </a:r>
             <a:endParaRPr lang="en-US" dirty="0"/>
           </a:p>
@@ -4897,22 +4990,71 @@
         </p:nvSpPr>
         <p:spPr/>
         <p:txBody>
-          <a:bodyPr>
-            <a:normAutofit/>
-          </a:bodyPr>
+          <a:bodyPr/>
           <a:lstStyle/>
           <a:p>
             <a:r>
-              <a:rPr lang="en-US" dirty="0" err="1" smtClean="0"/>
-              <a:t>Kế</a:t>
-            </a:r>
-            <a:r>
-              <a:rPr lang="en-US" dirty="0" smtClean="0"/>
-              <a:t> </a:t>
-            </a:r>
-            <a:r>
-              <a:rPr lang="en-US" dirty="0" err="1" smtClean="0"/>
-              <a:t>thừa</a:t>
+              <a:rPr lang="en-US" dirty="0" smtClean="0"/>
+              <a:t>Abstract method</a:t>
+            </a:r>
+          </a:p>
+          <a:p>
+            <a:pPr lvl="1"/>
+            <a:r>
+              <a:rPr lang="en-US" dirty="0" smtClean="0"/>
+              <a:t>Abstract </a:t>
+            </a:r>
+            <a:r>
+              <a:rPr lang="en-US" dirty="0"/>
+              <a:t>class </a:t>
+            </a:r>
+            <a:r>
+              <a:rPr lang="en-US" dirty="0" err="1" smtClean="0"/>
+              <a:t>Có</a:t>
+            </a:r>
+            <a:r>
+              <a:rPr lang="en-US" dirty="0" smtClean="0"/>
+              <a:t> </a:t>
+            </a:r>
+            <a:r>
+              <a:rPr lang="en-US" dirty="0" err="1" smtClean="0"/>
+              <a:t>thể</a:t>
+            </a:r>
+            <a:r>
+              <a:rPr lang="en-US" dirty="0" smtClean="0"/>
+              <a:t> </a:t>
+            </a:r>
+            <a:r>
+              <a:rPr lang="en-US" dirty="0" err="1" smtClean="0"/>
+              <a:t>thực</a:t>
+            </a:r>
+            <a:r>
+              <a:rPr lang="en-US" dirty="0" smtClean="0"/>
+              <a:t> </a:t>
+            </a:r>
+            <a:r>
+              <a:rPr lang="en-US" dirty="0" err="1" smtClean="0"/>
+              <a:t>hiện</a:t>
+            </a:r>
+            <a:r>
+              <a:rPr lang="en-US" dirty="0" smtClean="0"/>
+              <a:t> chi </a:t>
+            </a:r>
+            <a:r>
+              <a:rPr lang="en-US" dirty="0" err="1" smtClean="0"/>
+              <a:t>tiết</a:t>
+            </a:r>
+            <a:r>
+              <a:rPr lang="en-US" dirty="0"/>
+              <a:t> </a:t>
+            </a:r>
+            <a:r>
+              <a:rPr lang="en-US" dirty="0" smtClean="0"/>
+              <a:t>ở </a:t>
+            </a:r>
+            <a:r>
+              <a:rPr lang="en-US" dirty="0" err="1" smtClean="0"/>
+              <a:t>trong</a:t>
             </a:r>
             <a:endParaRPr lang="en-US" dirty="0" smtClean="0"/>
           </a:p>
@@ -4920,67 +5062,46 @@
             <a:pPr lvl="1"/>
             <a:r>
               <a:rPr lang="en-US" dirty="0" smtClean="0"/>
-              <a:t>Abstract Class: </a:t>
-            </a:r>
-            <a:r>
-              <a:rPr lang="en-US" dirty="0" err="1" smtClean="0"/>
-              <a:t>Đơn</a:t>
-            </a:r>
-            <a:r>
-              <a:rPr lang="en-US" dirty="0" smtClean="0"/>
-              <a:t> </a:t>
-            </a:r>
-            <a:r>
-              <a:rPr lang="en-US" dirty="0" err="1" smtClean="0"/>
-              <a:t>kế</a:t>
-            </a:r>
-            <a:r>
-              <a:rPr lang="en-US" dirty="0" smtClean="0"/>
-              <a:t> </a:t>
-            </a:r>
-            <a:r>
-              <a:rPr lang="en-US" dirty="0" err="1" smtClean="0"/>
-              <a:t>thừa</a:t>
-            </a:r>
-            <a:r>
-              <a:rPr lang="en-US" dirty="0" smtClean="0"/>
-              <a:t> - Abstract class </a:t>
-            </a:r>
-            <a:r>
-              <a:rPr lang="en-US" dirty="0" err="1" smtClean="0"/>
-              <a:t>chỉ</a:t>
-            </a:r>
-            <a:r>
-              <a:rPr lang="en-US" dirty="0" smtClean="0"/>
-              <a:t> </a:t>
-            </a:r>
-            <a:r>
-              <a:rPr lang="en-US" dirty="0" err="1" smtClean="0"/>
-              <a:t>có</a:t>
-            </a:r>
-            <a:r>
-              <a:rPr lang="en-US" dirty="0"/>
-              <a:t> </a:t>
-            </a:r>
-            <a:r>
-              <a:rPr lang="en-US" dirty="0" err="1" smtClean="0"/>
-              <a:t>thể</a:t>
-            </a:r>
-            <a:r>
-              <a:rPr lang="en-US" dirty="0" smtClean="0"/>
-              <a:t> extends </a:t>
-            </a:r>
-            <a:r>
-              <a:rPr lang="en-US" dirty="0" err="1" smtClean="0"/>
-              <a:t>từ</a:t>
-            </a:r>
-            <a:r>
-              <a:rPr lang="en-US" dirty="0" smtClean="0"/>
-              <a:t> </a:t>
-            </a:r>
-            <a:r>
-              <a:rPr lang="en-US" dirty="0" err="1" smtClean="0"/>
-              <a:t>một</a:t>
+              <a:t>Interface </a:t>
+            </a:r>
+            <a:r>
+              <a:rPr lang="en-US" dirty="0" err="1" smtClean="0"/>
+              <a:t>Không</a:t>
+            </a:r>
+            <a:r>
+              <a:rPr lang="en-US" dirty="0" smtClean="0"/>
+              <a:t> </a:t>
+            </a:r>
+            <a:r>
+              <a:rPr lang="en-US" dirty="0" err="1" smtClean="0"/>
+              <a:t>thực</a:t>
+            </a:r>
+            <a:r>
+              <a:rPr lang="en-US" dirty="0" smtClean="0"/>
+              <a:t> </a:t>
+            </a:r>
+            <a:r>
+              <a:rPr lang="en-US" dirty="0" err="1" smtClean="0"/>
+              <a:t>hiện</a:t>
+            </a:r>
+            <a:r>
+              <a:rPr lang="en-US" dirty="0" smtClean="0"/>
+              <a:t> chi </a:t>
+            </a:r>
+            <a:r>
+              <a:rPr lang="en-US" dirty="0" err="1" smtClean="0"/>
+              <a:t>tiết</a:t>
+            </a:r>
+            <a:endParaRPr lang="en-US" dirty="0" smtClean="0"/>
+          </a:p>
+          <a:p>
+            <a:r>
+              <a:rPr lang="en-US" dirty="0" smtClean="0"/>
+              <a:t>Access modifier </a:t>
+            </a:r>
+            <a:r>
+              <a:rPr lang="en-US" dirty="0" err="1" smtClean="0"/>
+              <a:t>của</a:t>
             </a:r>
             <a:r>
               <a:rPr lang="en-US" dirty="0" smtClean="0"/>
@@ -4992,140 +5113,8 @@
             </a:r>
             <a:r>
               <a:rPr lang="en-US" dirty="0" smtClean="0"/>
-              <a:t>class </a:t>
-            </a:r>
-            <a:r>
-              <a:rPr lang="en-US" dirty="0" err="1" smtClean="0"/>
-              <a:t>khác</a:t>
-            </a:r>
-            <a:endParaRPr lang="en-US" dirty="0" smtClean="0"/>
-          </a:p>
-          <a:p>
-            <a:pPr lvl="1"/>
-            <a:r>
-              <a:rPr lang="en-US" dirty="0" smtClean="0"/>
-              <a:t>Interface: </a:t>
-            </a:r>
-            <a:r>
-              <a:rPr lang="en-US" dirty="0" err="1" smtClean="0"/>
-              <a:t>Đa</a:t>
-            </a:r>
-            <a:r>
-              <a:rPr lang="en-US" dirty="0" smtClean="0"/>
-              <a:t> </a:t>
-            </a:r>
-            <a:r>
-              <a:rPr lang="en-US" dirty="0" err="1" smtClean="0"/>
-              <a:t>kế</a:t>
-            </a:r>
-            <a:r>
-              <a:rPr lang="en-US" dirty="0" smtClean="0"/>
-              <a:t> </a:t>
-            </a:r>
-            <a:r>
-              <a:rPr lang="en-US" dirty="0" err="1" smtClean="0"/>
-              <a:t>thừa</a:t>
-            </a:r>
-            <a:r>
-              <a:rPr lang="en-US" dirty="0"/>
-              <a:t> </a:t>
-            </a:r>
-            <a:r>
-              <a:rPr lang="en-US" dirty="0" smtClean="0"/>
-              <a:t>Interface </a:t>
-            </a:r>
-            <a:r>
-              <a:rPr lang="en-US" dirty="0" err="1" smtClean="0"/>
-              <a:t>có</a:t>
-            </a:r>
-            <a:r>
-              <a:rPr lang="en-US" dirty="0" smtClean="0"/>
-              <a:t> </a:t>
-            </a:r>
-            <a:r>
-              <a:rPr lang="en-US" dirty="0" err="1"/>
-              <a:t>thể</a:t>
-            </a:r>
-            <a:r>
-              <a:rPr lang="en-US" dirty="0"/>
-              <a:t> extend </a:t>
-            </a:r>
-            <a:r>
-              <a:rPr lang="en-US" dirty="0" err="1" smtClean="0"/>
-              <a:t>từ</a:t>
-            </a:r>
-            <a:r>
-              <a:rPr lang="en-US" dirty="0" smtClean="0"/>
-              <a:t> </a:t>
-            </a:r>
-            <a:r>
-              <a:rPr lang="en-US" dirty="0" err="1" smtClean="0"/>
-              <a:t>nhiều</a:t>
-            </a:r>
-            <a:r>
-              <a:rPr lang="en-US" dirty="0" smtClean="0"/>
-              <a:t> Interface </a:t>
-            </a:r>
-            <a:r>
-              <a:rPr lang="en-US" dirty="0" err="1" smtClean="0"/>
-              <a:t>khác</a:t>
-            </a:r>
-            <a:endParaRPr lang="en-US" dirty="0" smtClean="0"/>
-          </a:p>
-          <a:p>
-            <a:r>
-              <a:rPr lang="en-US" dirty="0" err="1" smtClean="0"/>
-              <a:t>Từ</a:t>
-            </a:r>
-            <a:r>
-              <a:rPr lang="en-US" dirty="0" smtClean="0"/>
-              <a:t> </a:t>
-            </a:r>
-            <a:r>
-              <a:rPr lang="en-US" dirty="0" err="1" smtClean="0"/>
-              <a:t>khóa</a:t>
-            </a:r>
-            <a:r>
-              <a:rPr lang="en-US" dirty="0" smtClean="0"/>
-              <a:t> </a:t>
-            </a:r>
-            <a:r>
-              <a:rPr lang="en-US" dirty="0" err="1" smtClean="0"/>
-              <a:t>kế</a:t>
-            </a:r>
-            <a:r>
-              <a:rPr lang="en-US" dirty="0" smtClean="0"/>
-              <a:t> </a:t>
-            </a:r>
-            <a:r>
-              <a:rPr lang="en-US" dirty="0" err="1" smtClean="0"/>
-              <a:t>thừa</a:t>
-            </a:r>
-            <a:r>
-              <a:rPr lang="en-US" dirty="0" smtClean="0"/>
-              <a:t> </a:t>
-            </a:r>
-            <a:r>
-              <a:rPr lang="en-US" dirty="0" err="1" smtClean="0"/>
-              <a:t>sử</a:t>
-            </a:r>
-            <a:r>
-              <a:rPr lang="en-US" dirty="0" smtClean="0"/>
-              <a:t> </a:t>
-            </a:r>
-            <a:r>
-              <a:rPr lang="en-US" dirty="0" err="1" smtClean="0"/>
-              <a:t>dụng</a:t>
-            </a:r>
-            <a:r>
-              <a:rPr lang="en-US" dirty="0" smtClean="0"/>
-              <a:t> </a:t>
-            </a:r>
-            <a:r>
-              <a:rPr lang="en-US" dirty="0" err="1" smtClean="0"/>
-              <a:t>được</a:t>
-            </a:r>
-            <a:endParaRPr lang="en-US" dirty="0"/>
+              <a:t>method</a:t>
+            </a:r>
           </a:p>
           <a:p>
             <a:pPr lvl="1"/>
@@ -5135,43 +5124,23 @@
             </a:r>
             <a:r>
               <a:rPr lang="en-US" dirty="0" smtClean="0"/>
-              <a:t>Class: </a:t>
-            </a:r>
-            <a:r>
-              <a:rPr lang="en-US" dirty="0" err="1" smtClean="0"/>
-              <a:t>sử</a:t>
-            </a:r>
-            <a:r>
-              <a:rPr lang="en-US" dirty="0" smtClean="0"/>
-              <a:t> </a:t>
-            </a:r>
-            <a:r>
-              <a:rPr lang="en-US" dirty="0" err="1" smtClean="0"/>
-              <a:t>dụng</a:t>
-            </a:r>
-            <a:r>
-              <a:rPr lang="en-US" dirty="0" smtClean="0"/>
-              <a:t> </a:t>
-            </a:r>
-            <a:r>
-              <a:rPr lang="en-US" dirty="0" err="1" smtClean="0"/>
-              <a:t>được</a:t>
-            </a:r>
-            <a:r>
-              <a:rPr lang="en-US" dirty="0" smtClean="0"/>
-              <a:t> </a:t>
-            </a:r>
-            <a:r>
-              <a:rPr lang="en-US" dirty="0"/>
-              <a:t>extend </a:t>
-            </a:r>
-            <a:r>
-              <a:rPr lang="en-US" dirty="0" err="1" smtClean="0"/>
-              <a:t>và</a:t>
-            </a:r>
-            <a:r>
-              <a:rPr lang="en-US" dirty="0" smtClean="0"/>
-              <a:t> implement</a:t>
+              <a:t>class: Access modifier: </a:t>
+            </a:r>
+            <a:r>
+              <a:rPr lang="en-US" dirty="0" err="1" smtClean="0"/>
+              <a:t>mặc</a:t>
+            </a:r>
+            <a:r>
+              <a:rPr lang="en-US" dirty="0" smtClean="0"/>
+              <a:t> </a:t>
+            </a:r>
+            <a:r>
+              <a:rPr lang="en-US" dirty="0" err="1" smtClean="0"/>
+              <a:t>định</a:t>
+            </a:r>
+            <a:r>
+              <a:rPr lang="en-US" dirty="0" smtClean="0"/>
+              <a:t>, protected, public</a:t>
             </a:r>
           </a:p>
           <a:p>
@@ -5190,20 +5159,63 @@
             </a:r>
             <a:r>
               <a:rPr lang="en-US" dirty="0" err="1" smtClean="0"/>
-              <a:t>sử</a:t>
-            </a:r>
-            <a:r>
-              <a:rPr lang="en-US" dirty="0" smtClean="0"/>
-              <a:t> </a:t>
-            </a:r>
-            <a:r>
-              <a:rPr lang="en-US" dirty="0" err="1" smtClean="0"/>
-              <a:t>dụng</a:t>
-            </a:r>
-            <a:r>
-              <a:rPr lang="en-US" dirty="0" smtClean="0"/>
-              <a:t> implement</a:t>
-            </a:r>
+              <a:t>có</a:t>
+            </a:r>
+            <a:r>
+              <a:rPr lang="en-US" dirty="0" smtClean="0"/>
+              <a:t> </a:t>
+            </a:r>
+            <a:r>
+              <a:rPr lang="en-US" dirty="0" err="1" smtClean="0"/>
+              <a:t>thể</a:t>
+            </a:r>
+            <a:r>
+              <a:rPr lang="en-US" dirty="0" smtClean="0"/>
+              <a:t> </a:t>
+            </a:r>
+            <a:r>
+              <a:rPr lang="en-US" dirty="0" err="1" smtClean="0"/>
+              <a:t>là</a:t>
+            </a:r>
+            <a:r>
+              <a:rPr lang="en-US" dirty="0" smtClean="0"/>
+              <a:t> public (</a:t>
+            </a:r>
+            <a:r>
+              <a:rPr lang="en-US" dirty="0" err="1" smtClean="0"/>
+              <a:t>khi</a:t>
+            </a:r>
+            <a:r>
+              <a:rPr lang="en-US" dirty="0" smtClean="0"/>
+              <a:t> compiler </a:t>
+            </a:r>
+            <a:r>
+              <a:rPr lang="en-US" dirty="0" err="1" smtClean="0"/>
+              <a:t>mặc</a:t>
+            </a:r>
+            <a:r>
+              <a:rPr lang="en-US" dirty="0" smtClean="0"/>
+              <a:t> </a:t>
+            </a:r>
+            <a:r>
+              <a:rPr lang="en-US" dirty="0" err="1" smtClean="0"/>
+              <a:t>định</a:t>
+            </a:r>
+            <a:r>
+              <a:rPr lang="en-US" dirty="0" smtClean="0"/>
+              <a:t> </a:t>
+            </a:r>
+            <a:r>
+              <a:rPr lang="en-US" dirty="0" err="1" smtClean="0"/>
+              <a:t>là</a:t>
+            </a:r>
+            <a:r>
+              <a:rPr lang="en-US" dirty="0" smtClean="0"/>
+              <a:t> public)</a:t>
+            </a:r>
+          </a:p>
+          <a:p>
+            <a:pPr lvl="1"/>
             <a:endParaRPr lang="en-US" dirty="0"/>
           </a:p>
         </p:txBody>
@@ -5211,7 +5223,7 @@
     </p:spTree>
     <p:extLst>
       <p:ext uri="{BB962C8B-B14F-4D97-AF65-F5344CB8AC3E}">
-        <p14:creationId xmlns:p14="http://schemas.microsoft.com/office/powerpoint/2010/main" val="1735282480"/>
+        <p14:creationId xmlns:p14="http://schemas.microsoft.com/office/powerpoint/2010/main" val="2452286896"/>
       </p:ext>
     </p:extLst>
   </p:cSld>
@@ -5240,38 +5252,254 @@
       </p:grpSpPr>
       <p:sp>
         <p:nvSpPr>
-          <p:cNvPr id="3" name="Content Placeholder 2"/>
-          <p:cNvSpPr>
-            <a:spLocks noGrp="1"/>
-          </p:cNvSpPr>
-          <p:nvPr>
-            <p:ph idx="1"/>
-          </p:nvPr>
-        </p:nvSpPr>
-        <p:spPr>
-          <a:xfrm>
-            <a:off x="533400" y="1676400"/>
-            <a:ext cx="8229600" cy="838200"/>
-          </a:xfrm>
-        </p:spPr>
+          <p:cNvPr id="2" name="Title 1"/>
+          <p:cNvSpPr>
+            <a:spLocks noGrp="1"/>
+          </p:cNvSpPr>
+          <p:nvPr>
+            <p:ph type="title"/>
+          </p:nvPr>
+        </p:nvSpPr>
+        <p:spPr/>
         <p:txBody>
           <a:bodyPr/>
           <a:lstStyle/>
           <a:p>
-            <a:pPr marL="0" indent="0">
-              <a:buNone/>
-            </a:pPr>
-            <a:r>
-              <a:rPr lang="en-US" dirty="0" err="1" smtClean="0"/>
-              <a:t>Khi</a:t>
-            </a:r>
-            <a:r>
-              <a:rPr lang="en-US" dirty="0" smtClean="0"/>
-              <a:t> </a:t>
-            </a:r>
-            <a:r>
-              <a:rPr lang="en-US" dirty="0" err="1" smtClean="0"/>
-              <a:t>nào</a:t>
+            <a:r>
+              <a:rPr lang="en-US" dirty="0" err="1" smtClean="0"/>
+              <a:t>Khác</a:t>
+            </a:r>
+            <a:r>
+              <a:rPr lang="en-US" dirty="0" smtClean="0"/>
+              <a:t> </a:t>
+            </a:r>
+            <a:r>
+              <a:rPr lang="en-US" dirty="0" err="1" smtClean="0"/>
+              <a:t>nhau</a:t>
+            </a:r>
+            <a:r>
+              <a:rPr lang="en-US" dirty="0" smtClean="0"/>
+              <a:t> (3)</a:t>
+            </a:r>
+            <a:endParaRPr lang="en-US" dirty="0"/>
+          </a:p>
+        </p:txBody>
+      </p:sp>
+      <p:sp>
+        <p:nvSpPr>
+          <p:cNvPr id="3" name="Content Placeholder 2"/>
+          <p:cNvSpPr>
+            <a:spLocks noGrp="1"/>
+          </p:cNvSpPr>
+          <p:nvPr>
+            <p:ph idx="1"/>
+          </p:nvPr>
+        </p:nvSpPr>
+        <p:spPr/>
+        <p:txBody>
+          <a:bodyPr>
+            <a:normAutofit/>
+          </a:bodyPr>
+          <a:lstStyle/>
+          <a:p>
+            <a:r>
+              <a:rPr lang="en-US" dirty="0" err="1" smtClean="0"/>
+              <a:t>Kế</a:t>
+            </a:r>
+            <a:r>
+              <a:rPr lang="en-US" dirty="0" smtClean="0"/>
+              <a:t> </a:t>
+            </a:r>
+            <a:r>
+              <a:rPr lang="en-US" dirty="0" err="1" smtClean="0"/>
+              <a:t>thừa</a:t>
+            </a:r>
+            <a:endParaRPr lang="en-US" dirty="0" smtClean="0"/>
+          </a:p>
+          <a:p>
+            <a:pPr lvl="1"/>
+            <a:r>
+              <a:rPr lang="en-US" dirty="0" smtClean="0"/>
+              <a:t>Abstract Class: </a:t>
+            </a:r>
+            <a:r>
+              <a:rPr lang="en-US" dirty="0" err="1" smtClean="0"/>
+              <a:t>Đơn</a:t>
+            </a:r>
+            <a:r>
+              <a:rPr lang="en-US" dirty="0" smtClean="0"/>
+              <a:t> </a:t>
+            </a:r>
+            <a:r>
+              <a:rPr lang="en-US" dirty="0" err="1" smtClean="0"/>
+              <a:t>kế</a:t>
+            </a:r>
+            <a:r>
+              <a:rPr lang="en-US" dirty="0" smtClean="0"/>
+              <a:t> </a:t>
+            </a:r>
+            <a:r>
+              <a:rPr lang="en-US" dirty="0" err="1" smtClean="0"/>
+              <a:t>thừa</a:t>
+            </a:r>
+            <a:r>
+              <a:rPr lang="en-US" dirty="0" smtClean="0"/>
+              <a:t> - Abstract class </a:t>
+            </a:r>
+            <a:r>
+              <a:rPr lang="en-US" dirty="0" err="1" smtClean="0"/>
+              <a:t>chỉ</a:t>
+            </a:r>
+            <a:r>
+              <a:rPr lang="en-US" dirty="0" smtClean="0"/>
+              <a:t> </a:t>
+            </a:r>
+            <a:r>
+              <a:rPr lang="en-US" dirty="0" err="1" smtClean="0"/>
+              <a:t>có</a:t>
+            </a:r>
+            <a:r>
+              <a:rPr lang="en-US" dirty="0"/>
+              <a:t> </a:t>
+            </a:r>
+            <a:r>
+              <a:rPr lang="en-US" dirty="0" err="1" smtClean="0"/>
+              <a:t>thể</a:t>
+            </a:r>
+            <a:r>
+              <a:rPr lang="en-US" dirty="0" smtClean="0"/>
+              <a:t> extends </a:t>
+            </a:r>
+            <a:r>
+              <a:rPr lang="en-US" dirty="0" err="1" smtClean="0"/>
+              <a:t>từ</a:t>
+            </a:r>
+            <a:r>
+              <a:rPr lang="en-US" dirty="0" smtClean="0"/>
+              <a:t> </a:t>
+            </a:r>
+            <a:r>
+              <a:rPr lang="en-US" dirty="0" err="1" smtClean="0"/>
+              <a:t>một</a:t>
+            </a:r>
+            <a:r>
+              <a:rPr lang="en-US" dirty="0" smtClean="0"/>
+              <a:t> </a:t>
+            </a:r>
+            <a:r>
+              <a:rPr lang="en-US" dirty="0"/>
+              <a:t>Abstract </a:t>
+            </a:r>
+            <a:r>
+              <a:rPr lang="en-US" dirty="0" smtClean="0"/>
+              <a:t>class </a:t>
+            </a:r>
+            <a:r>
+              <a:rPr lang="en-US" dirty="0" err="1" smtClean="0"/>
+              <a:t>khác</a:t>
+            </a:r>
+            <a:endParaRPr lang="en-US" dirty="0" smtClean="0"/>
+          </a:p>
+          <a:p>
+            <a:pPr lvl="1"/>
+            <a:r>
+              <a:rPr lang="en-US" dirty="0" smtClean="0"/>
+              <a:t>Interface: </a:t>
+            </a:r>
+            <a:r>
+              <a:rPr lang="en-US" dirty="0" err="1" smtClean="0"/>
+              <a:t>Đa</a:t>
+            </a:r>
+            <a:r>
+              <a:rPr lang="en-US" dirty="0" smtClean="0"/>
+              <a:t> </a:t>
+            </a:r>
+            <a:r>
+              <a:rPr lang="en-US" dirty="0" err="1" smtClean="0"/>
+              <a:t>kế</a:t>
+            </a:r>
+            <a:r>
+              <a:rPr lang="en-US" dirty="0" smtClean="0"/>
+              <a:t> </a:t>
+            </a:r>
+            <a:r>
+              <a:rPr lang="en-US" dirty="0" err="1" smtClean="0"/>
+              <a:t>thừa</a:t>
+            </a:r>
+            <a:r>
+              <a:rPr lang="en-US" dirty="0"/>
+              <a:t> </a:t>
+            </a:r>
+            <a:r>
+              <a:rPr lang="en-US" dirty="0" smtClean="0"/>
+              <a:t>Interface </a:t>
+            </a:r>
+            <a:r>
+              <a:rPr lang="en-US" dirty="0" err="1" smtClean="0"/>
+              <a:t>có</a:t>
+            </a:r>
+            <a:r>
+              <a:rPr lang="en-US" dirty="0" smtClean="0"/>
+              <a:t> </a:t>
+            </a:r>
+            <a:r>
+              <a:rPr lang="en-US" dirty="0" err="1"/>
+              <a:t>thể</a:t>
+            </a:r>
+            <a:r>
+              <a:rPr lang="en-US" dirty="0"/>
+              <a:t> extend </a:t>
+            </a:r>
+            <a:r>
+              <a:rPr lang="en-US" dirty="0" err="1" smtClean="0"/>
+              <a:t>từ</a:t>
+            </a:r>
+            <a:r>
+              <a:rPr lang="en-US" dirty="0" smtClean="0"/>
+              <a:t> </a:t>
+            </a:r>
+            <a:r>
+              <a:rPr lang="en-US" dirty="0" err="1" smtClean="0"/>
+              <a:t>nhiều</a:t>
+            </a:r>
+            <a:r>
+              <a:rPr lang="en-US" dirty="0" smtClean="0"/>
+              <a:t> Interface </a:t>
+            </a:r>
+            <a:r>
+              <a:rPr lang="en-US" dirty="0" err="1" smtClean="0"/>
+              <a:t>khác</a:t>
+            </a:r>
+            <a:endParaRPr lang="en-US" dirty="0" smtClean="0"/>
+          </a:p>
+          <a:p>
+            <a:r>
+              <a:rPr lang="en-US" dirty="0" err="1" smtClean="0"/>
+              <a:t>Từ</a:t>
+            </a:r>
+            <a:r>
+              <a:rPr lang="en-US" dirty="0" smtClean="0"/>
+              <a:t> </a:t>
+            </a:r>
+            <a:r>
+              <a:rPr lang="en-US" dirty="0" err="1" smtClean="0"/>
+              <a:t>khóa</a:t>
+            </a:r>
+            <a:r>
+              <a:rPr lang="en-US" dirty="0" smtClean="0"/>
+              <a:t> </a:t>
+            </a:r>
+            <a:r>
+              <a:rPr lang="en-US" dirty="0" err="1" smtClean="0"/>
+              <a:t>kế</a:t>
+            </a:r>
+            <a:r>
+              <a:rPr lang="en-US" dirty="0" smtClean="0"/>
+              <a:t> </a:t>
+            </a:r>
+            <a:r>
+              <a:rPr lang="en-US" dirty="0" err="1" smtClean="0"/>
+              <a:t>thừa</a:t>
             </a:r>
             <a:r>
               <a:rPr lang="en-US" dirty="0" smtClean="0"/>
@@ -5291,7 +5519,51 @@
             </a:r>
             <a:r>
               <a:rPr lang="en-US" dirty="0" smtClean="0"/>
-              <a:t> Abstract  Class </a:t>
+              <a:t> </a:t>
+            </a:r>
+            <a:r>
+              <a:rPr lang="en-US" dirty="0" err="1" smtClean="0"/>
+              <a:t>được</a:t>
+            </a:r>
+            <a:endParaRPr lang="en-US" dirty="0"/>
+          </a:p>
+          <a:p>
+            <a:pPr lvl="1"/>
+            <a:r>
+              <a:rPr lang="en-US" dirty="0"/>
+              <a:t>Abstract </a:t>
+            </a:r>
+            <a:r>
+              <a:rPr lang="en-US" dirty="0" smtClean="0"/>
+              <a:t>Class: </a:t>
+            </a:r>
+            <a:r>
+              <a:rPr lang="en-US" dirty="0" err="1" smtClean="0"/>
+              <a:t>sử</a:t>
+            </a:r>
+            <a:r>
+              <a:rPr lang="en-US" dirty="0" smtClean="0"/>
+              <a:t> </a:t>
+            </a:r>
+            <a:r>
+              <a:rPr lang="en-US" dirty="0" err="1" smtClean="0"/>
+              <a:t>dụng</a:t>
+            </a:r>
+            <a:r>
+              <a:rPr lang="en-US" dirty="0" smtClean="0"/>
+              <a:t> </a:t>
+            </a:r>
+            <a:r>
+              <a:rPr lang="en-US" dirty="0" err="1" smtClean="0"/>
+              <a:t>được</a:t>
+            </a:r>
+            <a:r>
+              <a:rPr lang="en-US" dirty="0" smtClean="0"/>
+              <a:t> </a:t>
+            </a:r>
+            <a:r>
+              <a:rPr lang="en-US" dirty="0"/>
+              <a:t>extend </a:t>
             </a:r>
             <a:r>
               <a:rPr lang="en-US" dirty="0" err="1" smtClean="0"/>
@@ -5299,171 +5571,47 @@
             </a:r>
             <a:r>
               <a:rPr lang="en-US" dirty="0" smtClean="0"/>
-              <a:t> Interface</a:t>
+              <a:t> implement</a:t>
+            </a:r>
+          </a:p>
+          <a:p>
+            <a:pPr lvl="1"/>
+            <a:r>
+              <a:rPr lang="en-US" dirty="0" smtClean="0"/>
+              <a:t>Interface: </a:t>
+            </a:r>
+            <a:r>
+              <a:rPr lang="en-US" dirty="0" err="1" smtClean="0"/>
+              <a:t>chỉ</a:t>
+            </a:r>
+            <a:r>
+              <a:rPr lang="en-US" dirty="0" smtClean="0"/>
+              <a:t> </a:t>
+            </a:r>
+            <a:r>
+              <a:rPr lang="en-US" dirty="0" err="1" smtClean="0"/>
+              <a:t>sử</a:t>
+            </a:r>
+            <a:r>
+              <a:rPr lang="en-US" dirty="0" smtClean="0"/>
+              <a:t> </a:t>
+            </a:r>
+            <a:r>
+              <a:rPr lang="en-US" dirty="0" err="1" smtClean="0"/>
+              <a:t>dụng</a:t>
+            </a:r>
+            <a:r>
+              <a:rPr lang="en-US" dirty="0" smtClean="0"/>
+              <a:t> implement</a:t>
             </a:r>
             <a:endParaRPr lang="en-US" dirty="0"/>
-          </a:p>
-        </p:txBody>
-      </p:sp>
-      <p:sp>
-        <p:nvSpPr>
-          <p:cNvPr id="4" name="Down Arrow 3"/>
-          <p:cNvSpPr/>
-          <p:nvPr/>
-        </p:nvSpPr>
-        <p:spPr>
-          <a:xfrm>
-            <a:off x="3200400" y="2438400"/>
-            <a:ext cx="1371600" cy="1295400"/>
-          </a:xfrm>
-          <a:prstGeom prst="downArrow">
-            <a:avLst/>
-          </a:prstGeom>
-        </p:spPr>
-        <p:style>
-          <a:lnRef idx="2">
-            <a:schemeClr val="accent1">
-              <a:shade val="50000"/>
-            </a:schemeClr>
-          </a:lnRef>
-          <a:fillRef idx="1">
-            <a:schemeClr val="accent1"/>
-          </a:fillRef>
-          <a:effectRef idx="0">
-            <a:schemeClr val="accent1"/>
-          </a:effectRef>
-          <a:fontRef idx="minor">
-            <a:schemeClr val="lt1"/>
-          </a:fontRef>
-        </p:style>
-        <p:txBody>
-          <a:bodyPr rtlCol="0" anchor="ctr"/>
-          <a:lstStyle/>
-          <a:p>
-            <a:pPr algn="ctr"/>
-            <a:endParaRPr lang="en-GB"/>
-          </a:p>
-        </p:txBody>
-      </p:sp>
-      <p:sp>
-        <p:nvSpPr>
-          <p:cNvPr id="5" name="Rectangle 4"/>
-          <p:cNvSpPr/>
-          <p:nvPr/>
-        </p:nvSpPr>
-        <p:spPr>
-          <a:xfrm>
-            <a:off x="2209800" y="3733800"/>
-            <a:ext cx="3505200" cy="1981200"/>
-          </a:xfrm>
-          <a:prstGeom prst="rect">
-            <a:avLst/>
-          </a:prstGeom>
-        </p:spPr>
-        <p:style>
-          <a:lnRef idx="2">
-            <a:schemeClr val="accent1">
-              <a:shade val="50000"/>
-            </a:schemeClr>
-          </a:lnRef>
-          <a:fillRef idx="1">
-            <a:schemeClr val="accent1"/>
-          </a:fillRef>
-          <a:effectRef idx="0">
-            <a:schemeClr val="accent1"/>
-          </a:effectRef>
-          <a:fontRef idx="minor">
-            <a:schemeClr val="lt1"/>
-          </a:fontRef>
-        </p:style>
-        <p:txBody>
-          <a:bodyPr rtlCol="0" anchor="ctr"/>
-          <a:lstStyle/>
-          <a:p>
-            <a:pPr algn="ctr"/>
-            <a:r>
-              <a:rPr lang="en-US" sz="2400" dirty="0" err="1" smtClean="0"/>
-              <a:t>Không</a:t>
-            </a:r>
-            <a:r>
-              <a:rPr lang="en-US" sz="2400" dirty="0" smtClean="0"/>
-              <a:t> </a:t>
-            </a:r>
-            <a:r>
-              <a:rPr lang="en-US" sz="2400" dirty="0" err="1" smtClean="0"/>
-              <a:t>có</a:t>
-            </a:r>
-            <a:r>
-              <a:rPr lang="en-US" sz="2400" dirty="0" smtClean="0"/>
-              <a:t> </a:t>
-            </a:r>
-            <a:r>
-              <a:rPr lang="en-US" sz="2400" dirty="0" err="1" smtClean="0"/>
-              <a:t>câu</a:t>
-            </a:r>
-            <a:r>
-              <a:rPr lang="en-US" sz="2400" dirty="0" smtClean="0"/>
-              <a:t> </a:t>
-            </a:r>
-            <a:r>
-              <a:rPr lang="en-US" sz="2400" dirty="0" err="1" smtClean="0"/>
-              <a:t>trả</a:t>
-            </a:r>
-            <a:r>
-              <a:rPr lang="en-US" sz="2400" dirty="0" smtClean="0"/>
-              <a:t> </a:t>
-            </a:r>
-            <a:r>
-              <a:rPr lang="en-US" sz="2400" dirty="0" err="1" smtClean="0"/>
-              <a:t>lời</a:t>
-            </a:r>
-            <a:r>
-              <a:rPr lang="en-US" sz="2400" dirty="0" smtClean="0"/>
-              <a:t>,</a:t>
-            </a:r>
-          </a:p>
-          <a:p>
-            <a:pPr algn="ctr"/>
-            <a:r>
-              <a:rPr lang="en-US" sz="2400" dirty="0" err="1" smtClean="0"/>
-              <a:t>Nên</a:t>
-            </a:r>
-            <a:r>
-              <a:rPr lang="en-US" sz="2400" dirty="0" smtClean="0"/>
-              <a:t> </a:t>
-            </a:r>
-            <a:r>
-              <a:rPr lang="en-US" sz="2400" dirty="0" err="1" smtClean="0"/>
-              <a:t>và</a:t>
-            </a:r>
-            <a:r>
-              <a:rPr lang="en-US" sz="2400" dirty="0" smtClean="0"/>
-              <a:t> </a:t>
-            </a:r>
-            <a:r>
-              <a:rPr lang="en-US" sz="2400" dirty="0" err="1" smtClean="0"/>
-              <a:t>không</a:t>
-            </a:r>
-            <a:r>
-              <a:rPr lang="en-US" sz="2400" dirty="0" smtClean="0"/>
-              <a:t> </a:t>
-            </a:r>
-            <a:r>
-              <a:rPr lang="en-US" sz="2400" dirty="0" err="1" smtClean="0"/>
-              <a:t>nên</a:t>
-            </a:r>
-            <a:r>
-              <a:rPr lang="en-US" sz="2400" dirty="0" smtClean="0"/>
-              <a:t>!</a:t>
-            </a:r>
-            <a:endParaRPr lang="en-GB" sz="2400" dirty="0"/>
           </a:p>
         </p:txBody>
       </p:sp>
     </p:spTree>
     <p:extLst>
       <p:ext uri="{BB962C8B-B14F-4D97-AF65-F5344CB8AC3E}">
-        <p14:creationId xmlns:p14="http://schemas.microsoft.com/office/powerpoint/2010/main" val="166558829"/>
+        <p14:creationId xmlns:p14="http://schemas.microsoft.com/office/powerpoint/2010/main" val="1735282480"/>
       </p:ext>
     </p:extLst>
   </p:cSld>
@@ -5492,34 +5640,66 @@
       </p:grpSpPr>
       <p:sp>
         <p:nvSpPr>
-          <p:cNvPr id="2" name="Title 1"/>
-          <p:cNvSpPr>
-            <a:spLocks noGrp="1"/>
-          </p:cNvSpPr>
-          <p:nvPr>
-            <p:ph type="title"/>
-          </p:nvPr>
-        </p:nvSpPr>
-        <p:spPr/>
+          <p:cNvPr id="3" name="Content Placeholder 2"/>
+          <p:cNvSpPr>
+            <a:spLocks noGrp="1"/>
+          </p:cNvSpPr>
+          <p:nvPr>
+            <p:ph idx="1"/>
+          </p:nvPr>
+        </p:nvSpPr>
+        <p:spPr>
+          <a:xfrm>
+            <a:off x="533400" y="1676400"/>
+            <a:ext cx="8229600" cy="838200"/>
+          </a:xfrm>
+        </p:spPr>
         <p:txBody>
           <a:bodyPr/>
           <a:lstStyle/>
           <a:p>
-            <a:r>
-              <a:rPr lang="en-US" dirty="0" err="1" smtClean="0"/>
-              <a:t>Tình</a:t>
-            </a:r>
-            <a:r>
-              <a:rPr lang="en-US" dirty="0" smtClean="0"/>
-              <a:t> </a:t>
-            </a:r>
-            <a:r>
-              <a:rPr lang="en-US" dirty="0" err="1" smtClean="0"/>
-              <a:t>huống</a:t>
-            </a:r>
-            <a:r>
-              <a:rPr lang="en-US" dirty="0" smtClean="0"/>
-              <a:t> (1)</a:t>
+            <a:pPr marL="0" indent="0">
+              <a:buNone/>
+            </a:pPr>
+            <a:r>
+              <a:rPr lang="en-US" dirty="0" err="1" smtClean="0"/>
+              <a:t>Khi</a:t>
+            </a:r>
+            <a:r>
+              <a:rPr lang="en-US" dirty="0" smtClean="0"/>
+              <a:t> </a:t>
+            </a:r>
+            <a:r>
+              <a:rPr lang="en-US" dirty="0" err="1" smtClean="0"/>
+              <a:t>nào</a:t>
+            </a:r>
+            <a:r>
+              <a:rPr lang="en-US" dirty="0" smtClean="0"/>
+              <a:t> </a:t>
+            </a:r>
+            <a:r>
+              <a:rPr lang="en-US" dirty="0" err="1" smtClean="0"/>
+              <a:t>sử</a:t>
+            </a:r>
+            <a:r>
+              <a:rPr lang="en-US" dirty="0" smtClean="0"/>
+              <a:t> </a:t>
+            </a:r>
+            <a:r>
+              <a:rPr lang="en-US" dirty="0" err="1" smtClean="0"/>
+              <a:t>dụng</a:t>
+            </a:r>
+            <a:r>
+              <a:rPr lang="en-US" dirty="0" smtClean="0"/>
+              <a:t> Abstract  Class </a:t>
+            </a:r>
+            <a:r>
+              <a:rPr lang="en-US" dirty="0" err="1" smtClean="0"/>
+              <a:t>và</a:t>
+            </a:r>
+            <a:r>
+              <a:rPr lang="en-US" dirty="0" smtClean="0"/>
+              <a:t> Interface</a:t>
             </a:r>
             <a:endParaRPr lang="en-US" dirty="0"/>
           </a:p>
@@ -5527,376 +5707,163 @@
       </p:sp>
       <p:sp>
         <p:nvSpPr>
-          <p:cNvPr id="3" name="Content Placeholder 2"/>
-          <p:cNvSpPr>
-            <a:spLocks noGrp="1"/>
-          </p:cNvSpPr>
-          <p:nvPr>
-            <p:ph idx="1"/>
-          </p:nvPr>
-        </p:nvSpPr>
-        <p:spPr/>
-        <p:txBody>
-          <a:bodyPr>
-            <a:normAutofit/>
-          </a:bodyPr>
+          <p:cNvPr id="4" name="Down Arrow 3"/>
+          <p:cNvSpPr/>
+          <p:nvPr/>
+        </p:nvSpPr>
+        <p:spPr>
+          <a:xfrm>
+            <a:off x="3200400" y="2438400"/>
+            <a:ext cx="1371600" cy="1295400"/>
+          </a:xfrm>
+          <a:prstGeom prst="downArrow">
+            <a:avLst/>
+          </a:prstGeom>
+        </p:spPr>
+        <p:style>
+          <a:lnRef idx="2">
+            <a:schemeClr val="accent1">
+              <a:shade val="50000"/>
+            </a:schemeClr>
+          </a:lnRef>
+          <a:fillRef idx="1">
+            <a:schemeClr val="accent1"/>
+          </a:fillRef>
+          <a:effectRef idx="0">
+            <a:schemeClr val="accent1"/>
+          </a:effectRef>
+          <a:fontRef idx="minor">
+            <a:schemeClr val="lt1"/>
+          </a:fontRef>
+        </p:style>
+        <p:txBody>
+          <a:bodyPr rtlCol="0" anchor="ctr"/>
           <a:lstStyle/>
           <a:p>
-            <a:r>
-              <a:rPr lang="en-US" dirty="0" err="1" smtClean="0"/>
+            <a:pPr algn="ctr"/>
+            <a:endParaRPr lang="en-GB"/>
+          </a:p>
+        </p:txBody>
+      </p:sp>
+      <p:sp>
+        <p:nvSpPr>
+          <p:cNvPr id="5" name="Rectangle 4"/>
+          <p:cNvSpPr/>
+          <p:nvPr/>
+        </p:nvSpPr>
+        <p:spPr>
+          <a:xfrm>
+            <a:off x="2209800" y="3733800"/>
+            <a:ext cx="3505200" cy="1981200"/>
+          </a:xfrm>
+          <a:prstGeom prst="rect">
+            <a:avLst/>
+          </a:prstGeom>
+        </p:spPr>
+        <p:style>
+          <a:lnRef idx="2">
+            <a:schemeClr val="accent1">
+              <a:shade val="50000"/>
+            </a:schemeClr>
+          </a:lnRef>
+          <a:fillRef idx="1">
+            <a:schemeClr val="accent1"/>
+          </a:fillRef>
+          <a:effectRef idx="0">
+            <a:schemeClr val="accent1"/>
+          </a:effectRef>
+          <a:fontRef idx="minor">
+            <a:schemeClr val="lt1"/>
+          </a:fontRef>
+        </p:style>
+        <p:txBody>
+          <a:bodyPr rtlCol="0" anchor="ctr"/>
+          <a:lstStyle/>
+          <a:p>
+            <a:pPr algn="ctr"/>
+            <a:r>
+              <a:rPr lang="en-US" sz="2400" dirty="0" err="1" smtClean="0"/>
               <a:t>Không</a:t>
             </a:r>
             <a:r>
-              <a:rPr lang="en-US" dirty="0" smtClean="0"/>
-              <a:t> </a:t>
-            </a:r>
-            <a:r>
-              <a:rPr lang="en-US" dirty="0" err="1" smtClean="0"/>
-              <a:t>cần</a:t>
-            </a:r>
-            <a:r>
-              <a:rPr lang="en-US" dirty="0" smtClean="0"/>
-              <a:t> </a:t>
-            </a:r>
-            <a:r>
-              <a:rPr lang="en-US" dirty="0" err="1" smtClean="0"/>
-              <a:t>khai</a:t>
-            </a:r>
-            <a:r>
-              <a:rPr lang="en-US" dirty="0" smtClean="0"/>
-              <a:t> </a:t>
-            </a:r>
-            <a:r>
-              <a:rPr lang="en-US" dirty="0" err="1" smtClean="0"/>
-              <a:t>báo</a:t>
-            </a:r>
-            <a:r>
-              <a:rPr lang="en-US" dirty="0" smtClean="0"/>
-              <a:t> </a:t>
-            </a:r>
-            <a:r>
-              <a:rPr lang="en-US" dirty="0" err="1" smtClean="0"/>
-              <a:t>biến</a:t>
-            </a:r>
-            <a:r>
-              <a:rPr lang="en-US" dirty="0" smtClean="0"/>
-              <a:t> </a:t>
-            </a:r>
-            <a:r>
-              <a:rPr lang="en-US" dirty="0" err="1" smtClean="0"/>
-              <a:t>giá</a:t>
-            </a:r>
-            <a:r>
-              <a:rPr lang="en-US" dirty="0" smtClean="0"/>
-              <a:t> </a:t>
-            </a:r>
-            <a:r>
-              <a:rPr lang="en-US" dirty="0" err="1" smtClean="0"/>
-              <a:t>trị</a:t>
-            </a:r>
-            <a:r>
-              <a:rPr lang="en-US" dirty="0" smtClean="0"/>
-              <a:t> </a:t>
-            </a:r>
-            <a:r>
-              <a:rPr lang="en-US" dirty="0" err="1" smtClean="0"/>
+              <a:rPr lang="en-US" sz="2400" dirty="0" smtClean="0"/>
+              <a:t> </a:t>
+            </a:r>
+            <a:r>
+              <a:rPr lang="en-US" sz="2400" dirty="0" err="1" smtClean="0"/>
               <a:t>có</a:t>
             </a:r>
             <a:r>
-              <a:rPr lang="en-US" dirty="0" smtClean="0"/>
-              <a:t> </a:t>
-            </a:r>
-            <a:r>
-              <a:rPr lang="en-US" dirty="0" err="1" smtClean="0"/>
-              <a:t>sẵn</a:t>
-            </a:r>
-            <a:r>
-              <a:rPr lang="en-US" dirty="0" smtClean="0"/>
-              <a:t> </a:t>
-            </a:r>
-            <a:r>
-              <a:rPr lang="en-US" dirty="0" err="1" smtClean="0"/>
+              <a:rPr lang="en-US" sz="2400" dirty="0" smtClean="0"/>
+              <a:t> </a:t>
+            </a:r>
+            <a:r>
+              <a:rPr lang="en-US" sz="2400" dirty="0" err="1" smtClean="0"/>
+              <a:t>câu</a:t>
+            </a:r>
+            <a:r>
+              <a:rPr lang="en-US" sz="2400" dirty="0" smtClean="0"/>
+              <a:t> </a:t>
+            </a:r>
+            <a:r>
+              <a:rPr lang="en-US" sz="2400" dirty="0" err="1" smtClean="0"/>
+              <a:t>trả</a:t>
+            </a:r>
+            <a:r>
+              <a:rPr lang="en-US" sz="2400" dirty="0" smtClean="0"/>
+              <a:t> </a:t>
+            </a:r>
+            <a:r>
+              <a:rPr lang="en-US" sz="2400" dirty="0" err="1" smtClean="0"/>
+              <a:t>lời</a:t>
+            </a:r>
+            <a:r>
+              <a:rPr lang="en-US" sz="2400" dirty="0" smtClean="0"/>
+              <a:t>,</a:t>
+            </a:r>
+          </a:p>
+          <a:p>
+            <a:pPr algn="ctr"/>
+            <a:r>
+              <a:rPr lang="en-US" sz="2400" dirty="0" err="1" smtClean="0"/>
+              <a:t>Nên</a:t>
+            </a:r>
+            <a:r>
+              <a:rPr lang="en-US" sz="2400" dirty="0" smtClean="0"/>
+              <a:t> </a:t>
+            </a:r>
+            <a:r>
+              <a:rPr lang="en-US" sz="2400" dirty="0" err="1" smtClean="0"/>
               <a:t>và</a:t>
             </a:r>
             <a:r>
-              <a:rPr lang="en-US" dirty="0" smtClean="0"/>
-              <a:t> </a:t>
-            </a:r>
-            <a:r>
-              <a:rPr lang="en-US" dirty="0" err="1" smtClean="0"/>
+              <a:rPr lang="en-US" sz="2400" dirty="0" smtClean="0"/>
+              <a:t> </a:t>
+            </a:r>
+            <a:r>
+              <a:rPr lang="en-US" sz="2400" dirty="0" err="1" smtClean="0"/>
               <a:t>không</a:t>
             </a:r>
             <a:r>
-              <a:rPr lang="en-US" dirty="0" smtClean="0"/>
-              <a:t> </a:t>
-            </a:r>
-            <a:r>
-              <a:rPr lang="en-US" dirty="0" err="1" smtClean="0"/>
-              <a:t>muốn</a:t>
-            </a:r>
-            <a:r>
-              <a:rPr lang="en-US" dirty="0" smtClean="0"/>
-              <a:t> public </a:t>
-            </a:r>
-            <a:r>
-              <a:rPr lang="en-US" dirty="0" err="1" smtClean="0"/>
-              <a:t>biến</a:t>
-            </a:r>
-            <a:r>
-              <a:rPr lang="en-US" dirty="0" smtClean="0"/>
-              <a:t>?</a:t>
-            </a:r>
-          </a:p>
-          <a:p>
-            <a:pPr lvl="1"/>
-            <a:r>
-              <a:rPr lang="en-US" dirty="0" smtClean="0"/>
-              <a:t>True =&gt; </a:t>
-            </a:r>
-            <a:r>
-              <a:rPr lang="en-US" dirty="0" err="1" smtClean="0"/>
-              <a:t>Nên</a:t>
-            </a:r>
-            <a:r>
-              <a:rPr lang="en-US" dirty="0" smtClean="0"/>
-              <a:t> </a:t>
-            </a:r>
-            <a:r>
-              <a:rPr lang="en-US" dirty="0" err="1" smtClean="0"/>
-              <a:t>sử</a:t>
-            </a:r>
-            <a:r>
-              <a:rPr lang="en-US" dirty="0" smtClean="0"/>
-              <a:t> </a:t>
-            </a:r>
-            <a:r>
-              <a:rPr lang="en-US" dirty="0" err="1" smtClean="0"/>
-              <a:t>dụng</a:t>
-            </a:r>
-            <a:r>
-              <a:rPr lang="en-US" dirty="0" smtClean="0"/>
-              <a:t> Abstract Class</a:t>
-            </a:r>
-            <a:endParaRPr lang="en-US" dirty="0"/>
-          </a:p>
-          <a:p>
-            <a:r>
-              <a:rPr lang="en-US" dirty="0" err="1" smtClean="0"/>
-              <a:t>Các</a:t>
-            </a:r>
-            <a:r>
-              <a:rPr lang="en-US" dirty="0" smtClean="0"/>
-              <a:t> subclass </a:t>
-            </a:r>
-            <a:r>
-              <a:rPr lang="en-US" dirty="0" err="1" smtClean="0"/>
-              <a:t>có</a:t>
-            </a:r>
-            <a:r>
-              <a:rPr lang="en-US" dirty="0" smtClean="0"/>
-              <a:t> </a:t>
-            </a:r>
-            <a:r>
-              <a:rPr lang="en-US" dirty="0" err="1" smtClean="0"/>
-              <a:t>liên</a:t>
-            </a:r>
-            <a:r>
-              <a:rPr lang="en-US" dirty="0" smtClean="0"/>
-              <a:t> </a:t>
-            </a:r>
-            <a:r>
-              <a:rPr lang="en-US" dirty="0" err="1" smtClean="0"/>
-              <a:t>quan</a:t>
-            </a:r>
-            <a:r>
-              <a:rPr lang="en-US" dirty="0" smtClean="0"/>
-              <a:t> </a:t>
-            </a:r>
-            <a:r>
-              <a:rPr lang="en-US" dirty="0" err="1" smtClean="0"/>
-              <a:t>gần</a:t>
-            </a:r>
-            <a:r>
-              <a:rPr lang="en-US" dirty="0" smtClean="0"/>
-              <a:t> </a:t>
-            </a:r>
-            <a:r>
-              <a:rPr lang="en-US" dirty="0" err="1" smtClean="0"/>
-              <a:t>nhau</a:t>
-            </a:r>
-            <a:r>
-              <a:rPr lang="en-US" dirty="0" smtClean="0"/>
-              <a:t> </a:t>
-            </a:r>
-            <a:r>
-              <a:rPr lang="en-US" dirty="0" err="1" smtClean="0"/>
-              <a:t>về</a:t>
-            </a:r>
-            <a:r>
-              <a:rPr lang="en-US" dirty="0" smtClean="0"/>
-              <a:t> </a:t>
-            </a:r>
-            <a:r>
-              <a:rPr lang="en-US" dirty="0" err="1" smtClean="0"/>
-              <a:t>đặc</a:t>
-            </a:r>
-            <a:r>
-              <a:rPr lang="en-US" dirty="0" smtClean="0"/>
-              <a:t> </a:t>
-            </a:r>
-            <a:r>
-              <a:rPr lang="en-US" dirty="0" err="1" smtClean="0"/>
-              <a:t>tính</a:t>
-            </a:r>
-            <a:r>
-              <a:rPr lang="en-US" dirty="0" smtClean="0"/>
-              <a:t>?</a:t>
-            </a:r>
-          </a:p>
-          <a:p>
-            <a:pPr lvl="1"/>
-            <a:r>
-              <a:rPr lang="en-US" dirty="0" smtClean="0"/>
-              <a:t>True =&gt; </a:t>
-            </a:r>
-            <a:r>
-              <a:rPr lang="en-US" dirty="0" err="1" smtClean="0"/>
-              <a:t>Nên</a:t>
-            </a:r>
-            <a:r>
-              <a:rPr lang="en-US" dirty="0" smtClean="0"/>
-              <a:t> </a:t>
-            </a:r>
-            <a:r>
-              <a:rPr lang="en-US" dirty="0" err="1"/>
-              <a:t>s</a:t>
-            </a:r>
-            <a:r>
-              <a:rPr lang="en-US" dirty="0" err="1" smtClean="0"/>
-              <a:t>ử</a:t>
-            </a:r>
-            <a:r>
-              <a:rPr lang="en-US" dirty="0" smtClean="0"/>
-              <a:t> </a:t>
-            </a:r>
-            <a:r>
-              <a:rPr lang="en-US" dirty="0" err="1" smtClean="0"/>
-              <a:t>dụng</a:t>
-            </a:r>
-            <a:r>
-              <a:rPr lang="en-US" dirty="0" smtClean="0"/>
-              <a:t> Abstract Class</a:t>
-            </a:r>
-          </a:p>
-          <a:p>
-            <a:r>
-              <a:rPr lang="en-US" dirty="0" err="1" smtClean="0"/>
-              <a:t>Có</a:t>
-            </a:r>
-            <a:r>
-              <a:rPr lang="en-US" dirty="0" smtClean="0"/>
-              <a:t> </a:t>
-            </a:r>
-            <a:r>
-              <a:rPr lang="en-US" dirty="0" err="1" smtClean="0"/>
-              <a:t>xu</a:t>
-            </a:r>
-            <a:r>
-              <a:rPr lang="en-US" dirty="0" smtClean="0"/>
-              <a:t> </a:t>
-            </a:r>
-            <a:r>
-              <a:rPr lang="en-US" dirty="0" err="1" smtClean="0"/>
-              <a:t>hướng</a:t>
-            </a:r>
-            <a:r>
-              <a:rPr lang="en-US" dirty="0" smtClean="0"/>
-              <a:t> </a:t>
-            </a:r>
-            <a:r>
-              <a:rPr lang="en-US" dirty="0" err="1" smtClean="0"/>
-              <a:t>nhằm</a:t>
-            </a:r>
-            <a:r>
-              <a:rPr lang="en-US" dirty="0" smtClean="0"/>
-              <a:t> </a:t>
-            </a:r>
-            <a:r>
-              <a:rPr lang="en-US" dirty="0" err="1" smtClean="0"/>
-              <a:t>khởi</a:t>
-            </a:r>
-            <a:r>
-              <a:rPr lang="en-US" dirty="0" smtClean="0"/>
-              <a:t> </a:t>
-            </a:r>
-            <a:r>
-              <a:rPr lang="en-US" dirty="0" err="1" smtClean="0"/>
-              <a:t>tạo</a:t>
-            </a:r>
-            <a:r>
-              <a:rPr lang="en-US" dirty="0" smtClean="0"/>
-              <a:t> </a:t>
-            </a:r>
-            <a:r>
-              <a:rPr lang="en-US" dirty="0" err="1" smtClean="0"/>
-              <a:t>đối</a:t>
-            </a:r>
-            <a:r>
-              <a:rPr lang="en-US" dirty="0" smtClean="0"/>
-              <a:t> </a:t>
-            </a:r>
-            <a:r>
-              <a:rPr lang="en-US" dirty="0" err="1" smtClean="0"/>
-              <a:t>tượng</a:t>
-            </a:r>
-            <a:r>
-              <a:rPr lang="en-US" dirty="0" smtClean="0"/>
-              <a:t>?</a:t>
-            </a:r>
-          </a:p>
-          <a:p>
-            <a:pPr lvl="1"/>
-            <a:r>
-              <a:rPr lang="en-US" dirty="0" smtClean="0"/>
-              <a:t>True =&gt; </a:t>
-            </a:r>
-            <a:r>
-              <a:rPr lang="en-US" dirty="0" err="1" smtClean="0"/>
-              <a:t>Nên</a:t>
-            </a:r>
-            <a:r>
-              <a:rPr lang="en-US" dirty="0" smtClean="0"/>
-              <a:t> </a:t>
-            </a:r>
-            <a:r>
-              <a:rPr lang="en-US" dirty="0" err="1" smtClean="0"/>
-              <a:t>sử</a:t>
-            </a:r>
-            <a:r>
-              <a:rPr lang="en-US" dirty="0" smtClean="0"/>
-              <a:t> </a:t>
-            </a:r>
-            <a:r>
-              <a:rPr lang="en-US" dirty="0" err="1" smtClean="0"/>
-              <a:t>dụng</a:t>
-            </a:r>
-            <a:r>
-              <a:rPr lang="en-US" dirty="0" smtClean="0"/>
-              <a:t> Abstract Class</a:t>
-            </a:r>
-          </a:p>
-          <a:p>
-            <a:endParaRPr lang="en-US" dirty="0" smtClean="0"/>
-          </a:p>
-          <a:p>
-            <a:endParaRPr lang="en-US" dirty="0"/>
+              <a:rPr lang="en-US" sz="2400" dirty="0" smtClean="0"/>
+              <a:t> </a:t>
+            </a:r>
+            <a:r>
+              <a:rPr lang="en-US" sz="2400" dirty="0" err="1" smtClean="0"/>
+              <a:t>nên</a:t>
+            </a:r>
+            <a:r>
+              <a:rPr lang="en-US" sz="2400" dirty="0" smtClean="0"/>
+              <a:t>!</a:t>
+            </a:r>
+            <a:endParaRPr lang="en-GB" sz="2400" dirty="0"/>
           </a:p>
         </p:txBody>
       </p:sp>
     </p:spTree>
     <p:extLst>
       <p:ext uri="{BB962C8B-B14F-4D97-AF65-F5344CB8AC3E}">
-        <p14:creationId xmlns:p14="http://schemas.microsoft.com/office/powerpoint/2010/main" val="2670548292"/>
+        <p14:creationId xmlns:p14="http://schemas.microsoft.com/office/powerpoint/2010/main" val="166558829"/>
       </p:ext>
     </p:extLst>
   </p:cSld>
@@ -5952,7 +5919,7 @@
             </a:r>
             <a:r>
               <a:rPr lang="en-US" dirty="0" smtClean="0"/>
-              <a:t> (2)</a:t>
+              <a:t> (1)</a:t>
             </a:r>
             <a:endParaRPr lang="en-US" dirty="0"/>
           </a:p>
@@ -5970,209 +5937,356 @@
         </p:nvSpPr>
         <p:spPr/>
         <p:txBody>
-          <a:bodyPr/>
+          <a:bodyPr>
+            <a:normAutofit/>
+          </a:bodyPr>
           <a:lstStyle/>
           <a:p>
             <a:r>
+              <a:rPr lang="en-US" dirty="0" err="1" smtClean="0"/>
+              <a:t>Không</a:t>
+            </a:r>
+            <a:r>
+              <a:rPr lang="en-US" dirty="0" smtClean="0"/>
+              <a:t> </a:t>
+            </a:r>
+            <a:r>
+              <a:rPr lang="en-US" dirty="0" err="1" smtClean="0"/>
+              <a:t>cần</a:t>
+            </a:r>
+            <a:r>
+              <a:rPr lang="en-US" dirty="0" smtClean="0"/>
+              <a:t> </a:t>
+            </a:r>
+            <a:r>
+              <a:rPr lang="en-US" dirty="0" err="1" smtClean="0"/>
+              <a:t>khai</a:t>
+            </a:r>
+            <a:r>
+              <a:rPr lang="en-US" dirty="0" smtClean="0"/>
+              <a:t> </a:t>
+            </a:r>
+            <a:r>
+              <a:rPr lang="en-US" dirty="0" err="1" smtClean="0"/>
+              <a:t>báo</a:t>
+            </a:r>
+            <a:r>
+              <a:rPr lang="en-US" dirty="0" smtClean="0"/>
+              <a:t> </a:t>
+            </a:r>
+            <a:r>
+              <a:rPr lang="en-US" dirty="0" err="1" smtClean="0"/>
+              <a:t>biến</a:t>
+            </a:r>
+            <a:r>
+              <a:rPr lang="en-US" dirty="0" smtClean="0"/>
+              <a:t> </a:t>
+            </a:r>
+            <a:r>
+              <a:rPr lang="en-US" dirty="0" err="1" smtClean="0"/>
+              <a:t>giá</a:t>
+            </a:r>
+            <a:r>
+              <a:rPr lang="en-US" dirty="0" smtClean="0"/>
+              <a:t> </a:t>
+            </a:r>
+            <a:r>
+              <a:rPr lang="en-US" dirty="0" err="1" smtClean="0"/>
+              <a:t>trị</a:t>
+            </a:r>
+            <a:r>
+              <a:rPr lang="en-US" dirty="0" smtClean="0"/>
+              <a:t> </a:t>
+            </a:r>
+            <a:r>
+              <a:rPr lang="en-US" dirty="0" err="1" smtClean="0"/>
+              <a:t>có</a:t>
+            </a:r>
+            <a:r>
+              <a:rPr lang="en-US" dirty="0" smtClean="0"/>
+              <a:t> </a:t>
+            </a:r>
+            <a:r>
+              <a:rPr lang="en-US" dirty="0" err="1" smtClean="0"/>
+              <a:t>sẵn</a:t>
+            </a:r>
+            <a:r>
+              <a:rPr lang="en-US" dirty="0" smtClean="0"/>
+              <a:t> </a:t>
+            </a:r>
+            <a:r>
+              <a:rPr lang="en-US" dirty="0" err="1" smtClean="0"/>
+              <a:t>và</a:t>
+            </a:r>
+            <a:r>
+              <a:rPr lang="en-US" dirty="0" smtClean="0"/>
+              <a:t> </a:t>
+            </a:r>
+            <a:r>
+              <a:rPr lang="en-US" dirty="0" err="1" smtClean="0"/>
+              <a:t>không</a:t>
+            </a:r>
+            <a:r>
+              <a:rPr lang="en-US" dirty="0" smtClean="0"/>
+              <a:t> </a:t>
+            </a:r>
+            <a:r>
+              <a:rPr lang="en-US" dirty="0" err="1" smtClean="0"/>
+              <a:t>muốn</a:t>
+            </a:r>
+            <a:r>
+              <a:rPr lang="en-US" dirty="0" smtClean="0"/>
+              <a:t> public </a:t>
+            </a:r>
+            <a:r>
+              <a:rPr lang="en-US" dirty="0" err="1" smtClean="0"/>
+              <a:t>biến</a:t>
+            </a:r>
+            <a:r>
+              <a:rPr lang="en-US" dirty="0" smtClean="0"/>
+              <a:t>?</a:t>
+            </a:r>
+          </a:p>
+          <a:p>
+            <a:pPr lvl="1"/>
+            <a:r>
+              <a:rPr lang="en-US" dirty="0" smtClean="0"/>
+              <a:t>True =&gt; </a:t>
+            </a:r>
+            <a:r>
+              <a:rPr lang="en-US" dirty="0" err="1" smtClean="0"/>
+              <a:t>Nên</a:t>
+            </a:r>
+            <a:r>
+              <a:rPr lang="en-US" dirty="0" smtClean="0"/>
+              <a:t> </a:t>
+            </a:r>
+            <a:r>
+              <a:rPr lang="en-US" dirty="0" err="1" smtClean="0"/>
+              <a:t>sử</a:t>
+            </a:r>
+            <a:r>
+              <a:rPr lang="en-US" dirty="0" smtClean="0"/>
+              <a:t> </a:t>
+            </a:r>
+            <a:r>
+              <a:rPr lang="en-US" dirty="0" err="1" smtClean="0"/>
+              <a:t>dụng</a:t>
+            </a:r>
+            <a:r>
+              <a:rPr lang="en-US" dirty="0" smtClean="0"/>
+              <a:t> Abstract Class</a:t>
+            </a:r>
+            <a:endParaRPr lang="en-US" dirty="0"/>
+          </a:p>
+          <a:p>
+            <a:r>
+              <a:rPr lang="en-US" dirty="0" err="1" smtClean="0"/>
+              <a:t>Các</a:t>
+            </a:r>
+            <a:r>
+              <a:rPr lang="en-US" dirty="0" smtClean="0"/>
+              <a:t> subclass </a:t>
+            </a:r>
+            <a:r>
+              <a:rPr lang="en-US" dirty="0" err="1" smtClean="0"/>
+              <a:t>có</a:t>
+            </a:r>
+            <a:r>
+              <a:rPr lang="en-US" dirty="0" smtClean="0"/>
+              <a:t> </a:t>
+            </a:r>
+            <a:r>
+              <a:rPr lang="en-US" dirty="0" err="1" smtClean="0"/>
+              <a:t>liên</a:t>
+            </a:r>
+            <a:r>
+              <a:rPr lang="en-US" dirty="0" smtClean="0"/>
+              <a:t> </a:t>
+            </a:r>
+            <a:r>
+              <a:rPr lang="en-US" dirty="0" err="1" smtClean="0"/>
+              <a:t>quan</a:t>
+            </a:r>
+            <a:r>
+              <a:rPr lang="en-US" dirty="0" smtClean="0"/>
+              <a:t> </a:t>
+            </a:r>
+            <a:r>
+              <a:rPr lang="en-US" dirty="0" err="1" smtClean="0"/>
+              <a:t>gần</a:t>
+            </a:r>
+            <a:r>
+              <a:rPr lang="en-US" dirty="0" smtClean="0"/>
+              <a:t> </a:t>
+            </a:r>
+            <a:r>
+              <a:rPr lang="en-US" dirty="0" err="1" smtClean="0"/>
+              <a:t>nhau</a:t>
+            </a:r>
+            <a:r>
+              <a:rPr lang="en-US" dirty="0" smtClean="0"/>
+              <a:t> </a:t>
+            </a:r>
+            <a:r>
+              <a:rPr lang="en-US" dirty="0" err="1" smtClean="0"/>
+              <a:t>về</a:t>
+            </a:r>
+            <a:r>
+              <a:rPr lang="en-US" dirty="0" smtClean="0"/>
+              <a:t> </a:t>
+            </a:r>
+            <a:r>
+              <a:rPr lang="en-US" dirty="0" err="1" smtClean="0"/>
+              <a:t>đặc</a:t>
+            </a:r>
+            <a:r>
+              <a:rPr lang="en-US" dirty="0" smtClean="0"/>
+              <a:t> </a:t>
+            </a:r>
+            <a:r>
+              <a:rPr lang="en-US" dirty="0" err="1" smtClean="0"/>
+              <a:t>tính</a:t>
+            </a:r>
+            <a:r>
+              <a:rPr lang="en-US" dirty="0" smtClean="0"/>
+              <a:t>?</a:t>
+            </a:r>
+          </a:p>
+          <a:p>
+            <a:pPr lvl="1"/>
+            <a:r>
+              <a:rPr lang="en-US" dirty="0" smtClean="0"/>
+              <a:t>True =&gt; </a:t>
+            </a:r>
+            <a:r>
+              <a:rPr lang="en-US" dirty="0" err="1" smtClean="0"/>
+              <a:t>Nên</a:t>
+            </a:r>
+            <a:r>
+              <a:rPr lang="en-US" dirty="0" smtClean="0"/>
+              <a:t> </a:t>
+            </a:r>
+            <a:r>
               <a:rPr lang="en-US" dirty="0" err="1"/>
+              <a:t>s</a:t>
+            </a:r>
+            <a:r>
+              <a:rPr lang="en-US" dirty="0" err="1" smtClean="0"/>
+              <a:t>ử</a:t>
+            </a:r>
+            <a:r>
+              <a:rPr lang="en-US" dirty="0" smtClean="0"/>
+              <a:t> </a:t>
+            </a:r>
+            <a:r>
+              <a:rPr lang="en-US" dirty="0" err="1" smtClean="0"/>
+              <a:t>dụng</a:t>
+            </a:r>
+            <a:r>
+              <a:rPr lang="en-US" dirty="0" smtClean="0"/>
+              <a:t> Abstract Class</a:t>
+            </a:r>
+          </a:p>
+          <a:p>
+            <a:r>
+              <a:rPr lang="en-US" dirty="0" err="1" smtClean="0"/>
               <a:t>Có</a:t>
             </a:r>
             <a:r>
-              <a:rPr lang="en-US" dirty="0"/>
-              <a:t> </a:t>
-            </a:r>
-            <a:r>
-              <a:rPr lang="en-US" dirty="0" err="1"/>
+              <a:rPr lang="en-US" dirty="0" smtClean="0"/>
+              <a:t> </a:t>
+            </a:r>
+            <a:r>
+              <a:rPr lang="en-US" dirty="0" err="1" smtClean="0"/>
               <a:t>xu</a:t>
             </a:r>
             <a:r>
-              <a:rPr lang="en-US" dirty="0"/>
-              <a:t> </a:t>
-            </a:r>
-            <a:r>
-              <a:rPr lang="en-US" dirty="0" err="1"/>
+              <a:rPr lang="en-US" dirty="0" smtClean="0"/>
+              <a:t> </a:t>
+            </a:r>
+            <a:r>
+              <a:rPr lang="en-US" dirty="0" err="1" smtClean="0"/>
               <a:t>hướng</a:t>
             </a:r>
             <a:r>
-              <a:rPr lang="en-US" dirty="0"/>
-              <a:t> </a:t>
-            </a:r>
-            <a:r>
-              <a:rPr lang="en-US" dirty="0" err="1"/>
-              <a:t>quản</a:t>
-            </a:r>
-            <a:r>
-              <a:rPr lang="en-US" dirty="0"/>
-              <a:t> </a:t>
-            </a:r>
-            <a:r>
-              <a:rPr lang="en-US" dirty="0" err="1"/>
-              <a:t>lý</a:t>
-            </a:r>
-            <a:r>
-              <a:rPr lang="en-US" dirty="0"/>
-              <a:t> </a:t>
-            </a:r>
-            <a:r>
-              <a:rPr lang="en-US" dirty="0" err="1"/>
-              <a:t>hành</a:t>
-            </a:r>
-            <a:r>
-              <a:rPr lang="en-US" dirty="0"/>
-              <a:t> vi?</a:t>
+              <a:rPr lang="en-US" dirty="0" smtClean="0"/>
+              <a:t> </a:t>
+            </a:r>
+            <a:r>
+              <a:rPr lang="en-US" dirty="0" err="1" smtClean="0"/>
+              <a:t>nhằm</a:t>
+            </a:r>
+            <a:r>
+              <a:rPr lang="en-US" dirty="0" smtClean="0"/>
+              <a:t> </a:t>
+            </a:r>
+            <a:r>
+              <a:rPr lang="en-US" dirty="0" err="1" smtClean="0"/>
+              <a:t>khởi</a:t>
+            </a:r>
+            <a:r>
+              <a:rPr lang="en-US" dirty="0" smtClean="0"/>
+              <a:t> </a:t>
+            </a:r>
+            <a:r>
+              <a:rPr lang="en-US" dirty="0" err="1" smtClean="0"/>
+              <a:t>tạo</a:t>
+            </a:r>
+            <a:r>
+              <a:rPr lang="en-US" dirty="0" smtClean="0"/>
+              <a:t> </a:t>
+            </a:r>
+            <a:r>
+              <a:rPr lang="en-US" dirty="0" err="1" smtClean="0"/>
+              <a:t>đối</a:t>
+            </a:r>
+            <a:r>
+              <a:rPr lang="en-US" dirty="0" smtClean="0"/>
+              <a:t> </a:t>
+            </a:r>
+            <a:r>
+              <a:rPr lang="en-US" dirty="0" err="1" smtClean="0"/>
+              <a:t>tượng</a:t>
+            </a:r>
+            <a:r>
+              <a:rPr lang="en-US" dirty="0" smtClean="0"/>
+              <a:t>?</a:t>
             </a:r>
           </a:p>
           <a:p>
             <a:pPr lvl="1"/>
             <a:r>
-              <a:rPr lang="en-US" dirty="0"/>
+              <a:rPr lang="en-US" dirty="0" smtClean="0"/>
               <a:t>True =&gt; </a:t>
             </a:r>
             <a:r>
-              <a:rPr lang="en-US" dirty="0" err="1"/>
-              <a:t>nên</a:t>
-            </a:r>
-            <a:r>
-              <a:rPr lang="en-US" dirty="0"/>
-              <a:t> </a:t>
-            </a:r>
-            <a:r>
-              <a:rPr lang="en-US" dirty="0" err="1"/>
+              <a:rPr lang="en-US" dirty="0" err="1" smtClean="0"/>
+              <a:t>Nên</a:t>
+            </a:r>
+            <a:r>
+              <a:rPr lang="en-US" dirty="0" smtClean="0"/>
+              <a:t> </a:t>
+            </a:r>
+            <a:r>
+              <a:rPr lang="en-US" dirty="0" err="1" smtClean="0"/>
               <a:t>sử</a:t>
             </a:r>
             <a:r>
-              <a:rPr lang="en-US" dirty="0"/>
-              <a:t> </a:t>
-            </a:r>
-            <a:r>
-              <a:rPr lang="en-US" dirty="0" err="1"/>
+              <a:rPr lang="en-US" dirty="0" smtClean="0"/>
+              <a:t> </a:t>
+            </a:r>
+            <a:r>
+              <a:rPr lang="en-US" dirty="0" err="1" smtClean="0"/>
               <a:t>dụng</a:t>
             </a:r>
             <a:r>
-              <a:rPr lang="en-US" dirty="0"/>
-              <a:t> Interface</a:t>
-            </a:r>
-          </a:p>
-          <a:p>
-            <a:r>
-              <a:rPr lang="en-US" dirty="0" err="1"/>
-              <a:t>Các</a:t>
-            </a:r>
-            <a:r>
-              <a:rPr lang="en-US" dirty="0"/>
-              <a:t> subclass </a:t>
-            </a:r>
-            <a:r>
-              <a:rPr lang="en-US" dirty="0" err="1"/>
-              <a:t>không</a:t>
-            </a:r>
-            <a:r>
-              <a:rPr lang="en-US" dirty="0"/>
-              <a:t> </a:t>
-            </a:r>
-            <a:r>
-              <a:rPr lang="en-US" dirty="0" err="1"/>
-              <a:t>nhất</a:t>
-            </a:r>
-            <a:r>
-              <a:rPr lang="en-US" dirty="0"/>
-              <a:t> </a:t>
-            </a:r>
-            <a:r>
-              <a:rPr lang="en-US" dirty="0" err="1"/>
-              <a:t>thiết</a:t>
-            </a:r>
-            <a:r>
-              <a:rPr lang="en-US" dirty="0"/>
-              <a:t> </a:t>
-            </a:r>
-            <a:r>
-              <a:rPr lang="en-US" dirty="0" err="1"/>
-              <a:t>thể</a:t>
-            </a:r>
-            <a:r>
-              <a:rPr lang="en-US" dirty="0"/>
-              <a:t> </a:t>
-            </a:r>
-            <a:r>
-              <a:rPr lang="en-US" dirty="0" err="1"/>
-              <a:t>hiện</a:t>
-            </a:r>
-            <a:r>
-              <a:rPr lang="en-US" dirty="0"/>
-              <a:t> </a:t>
-            </a:r>
-            <a:r>
-              <a:rPr lang="en-US" dirty="0" err="1"/>
-              <a:t>các</a:t>
-            </a:r>
-            <a:r>
-              <a:rPr lang="en-US" dirty="0"/>
-              <a:t> </a:t>
-            </a:r>
-            <a:r>
-              <a:rPr lang="en-US" dirty="0" err="1"/>
-              <a:t>hành</a:t>
-            </a:r>
-            <a:r>
-              <a:rPr lang="en-US" dirty="0"/>
-              <a:t> vi </a:t>
-            </a:r>
-            <a:r>
-              <a:rPr lang="en-US" dirty="0" err="1"/>
-              <a:t>dựng</a:t>
-            </a:r>
-            <a:r>
-              <a:rPr lang="en-US" dirty="0"/>
-              <a:t> </a:t>
-            </a:r>
-            <a:r>
-              <a:rPr lang="en-US" dirty="0" err="1"/>
-              <a:t>sẵn</a:t>
-            </a:r>
-            <a:r>
-              <a:rPr lang="en-US" dirty="0"/>
-              <a:t> </a:t>
-            </a:r>
-            <a:r>
-              <a:rPr lang="en-US" dirty="0" err="1"/>
-              <a:t>từ</a:t>
-            </a:r>
-            <a:r>
-              <a:rPr lang="en-US" dirty="0"/>
-              <a:t> interface?</a:t>
-            </a:r>
-          </a:p>
-          <a:p>
-            <a:pPr lvl="1"/>
-            <a:r>
-              <a:rPr lang="en-US" dirty="0"/>
-              <a:t>True =&gt; </a:t>
-            </a:r>
-            <a:r>
-              <a:rPr lang="en-US" dirty="0" err="1"/>
-              <a:t>Nên</a:t>
-            </a:r>
-            <a:r>
-              <a:rPr lang="en-US" dirty="0"/>
-              <a:t> </a:t>
-            </a:r>
-            <a:r>
-              <a:rPr lang="en-US" dirty="0" err="1"/>
-              <a:t>sử</a:t>
-            </a:r>
-            <a:r>
-              <a:rPr lang="en-US" dirty="0"/>
-              <a:t> </a:t>
-            </a:r>
-            <a:r>
-              <a:rPr lang="en-US" dirty="0" err="1"/>
-              <a:t>dụng</a:t>
-            </a:r>
-            <a:r>
-              <a:rPr lang="en-US" dirty="0"/>
-              <a:t>  Abstract Class</a:t>
-            </a:r>
+              <a:rPr lang="en-US" dirty="0" smtClean="0"/>
+              <a:t> Abstract Class</a:t>
+            </a:r>
+          </a:p>
+          <a:p>
+            <a:endParaRPr lang="en-US" dirty="0" smtClean="0"/>
           </a:p>
           <a:p>
             <a:endParaRPr lang="en-US" dirty="0"/>
@@ -6182,7 +6296,7 @@
     </p:spTree>
     <p:extLst>
       <p:ext uri="{BB962C8B-B14F-4D97-AF65-F5344CB8AC3E}">
-        <p14:creationId xmlns:p14="http://schemas.microsoft.com/office/powerpoint/2010/main" val="3444109457"/>
+        <p14:creationId xmlns:p14="http://schemas.microsoft.com/office/powerpoint/2010/main" val="2670548292"/>
       </p:ext>
     </p:extLst>
   </p:cSld>
@@ -6226,15 +6340,19 @@
           <a:p>
             <a:r>
               <a:rPr lang="en-US" dirty="0" err="1" smtClean="0"/>
-              <a:t>Tóm</a:t>
-            </a:r>
-            <a:r>
-              <a:rPr lang="en-US" dirty="0" smtClean="0"/>
-              <a:t> </a:t>
-            </a:r>
-            <a:r>
-              <a:rPr lang="en-US" dirty="0" err="1" smtClean="0"/>
-              <a:t>tắt</a:t>
+              <a:t>Tình</a:t>
+            </a:r>
+            <a:r>
+              <a:rPr lang="en-US" dirty="0" smtClean="0"/>
+              <a:t> </a:t>
+            </a:r>
+            <a:r>
+              <a:rPr lang="en-US" dirty="0" err="1" smtClean="0"/>
+              <a:t>huống</a:t>
+            </a:r>
+            <a:r>
+              <a:rPr lang="en-US" dirty="0" smtClean="0"/>
+              <a:t> (2)</a:t>
             </a:r>
             <a:endParaRPr lang="en-US" dirty="0"/>
           </a:p>
@@ -6256,166 +6374,207 @@
           <a:lstStyle/>
           <a:p>
             <a:r>
-              <a:rPr lang="en-US" dirty="0" err="1" smtClean="0"/>
-              <a:t>Biết</a:t>
-            </a:r>
-            <a:r>
-              <a:rPr lang="en-US" dirty="0" smtClean="0"/>
-              <a:t> </a:t>
-            </a:r>
-            <a:r>
-              <a:rPr lang="en-US" dirty="0" err="1" smtClean="0"/>
-              <a:t>tính</a:t>
-            </a:r>
-            <a:r>
-              <a:rPr lang="en-US" dirty="0" smtClean="0"/>
-              <a:t> </a:t>
-            </a:r>
-            <a:r>
-              <a:rPr lang="en-US" dirty="0" err="1" smtClean="0"/>
-              <a:t>trừu</a:t>
-            </a:r>
-            <a:r>
-              <a:rPr lang="en-US" dirty="0" smtClean="0"/>
-              <a:t> </a:t>
-            </a:r>
-            <a:r>
-              <a:rPr lang="en-US" dirty="0" err="1" smtClean="0"/>
-              <a:t>tượng</a:t>
-            </a:r>
-            <a:r>
-              <a:rPr lang="en-US" dirty="0" smtClean="0"/>
-              <a:t> </a:t>
-            </a:r>
-            <a:r>
-              <a:rPr lang="en-US" dirty="0" err="1" smtClean="0"/>
-              <a:t>của</a:t>
-            </a:r>
-            <a:r>
-              <a:rPr lang="en-US" dirty="0" smtClean="0"/>
-              <a:t> Java</a:t>
+              <a:rPr lang="en-US" dirty="0" err="1"/>
+              <a:t>Có</a:t>
+            </a:r>
+            <a:r>
+              <a:rPr lang="en-US" dirty="0"/>
+              <a:t> </a:t>
+            </a:r>
+            <a:r>
+              <a:rPr lang="en-US" dirty="0" err="1"/>
+              <a:t>xu</a:t>
+            </a:r>
+            <a:r>
+              <a:rPr lang="en-US" dirty="0"/>
+              <a:t> </a:t>
+            </a:r>
+            <a:r>
+              <a:rPr lang="en-US" dirty="0" err="1"/>
+              <a:t>hướng</a:t>
+            </a:r>
+            <a:r>
+              <a:rPr lang="en-US" dirty="0"/>
+              <a:t> </a:t>
+            </a:r>
+            <a:r>
+              <a:rPr lang="en-US" dirty="0" err="1"/>
+              <a:t>quản</a:t>
+            </a:r>
+            <a:r>
+              <a:rPr lang="en-US" dirty="0"/>
+              <a:t> </a:t>
+            </a:r>
+            <a:r>
+              <a:rPr lang="en-US" dirty="0" err="1"/>
+              <a:t>lý</a:t>
+            </a:r>
+            <a:r>
+              <a:rPr lang="en-US" dirty="0"/>
+              <a:t> </a:t>
+            </a:r>
+            <a:r>
+              <a:rPr lang="en-US" dirty="0" err="1"/>
+              <a:t>hành</a:t>
+            </a:r>
+            <a:r>
+              <a:rPr lang="en-US" dirty="0"/>
+              <a:t> vi?</a:t>
             </a:r>
           </a:p>
           <a:p>
             <a:pPr lvl="1"/>
             <a:r>
-              <a:rPr lang="en-US" dirty="0" smtClean="0"/>
-              <a:t>Abstract method</a:t>
+              <a:rPr lang="en-US" dirty="0"/>
+              <a:t>True =&gt; </a:t>
+            </a:r>
+            <a:r>
+              <a:rPr lang="en-US" dirty="0" err="1"/>
+              <a:t>nên</a:t>
+            </a:r>
+            <a:r>
+              <a:rPr lang="en-US" dirty="0"/>
+              <a:t> </a:t>
+            </a:r>
+            <a:r>
+              <a:rPr lang="en-US" dirty="0" err="1"/>
+              <a:t>sử</a:t>
+            </a:r>
+            <a:r>
+              <a:rPr lang="en-US" dirty="0"/>
+              <a:t> </a:t>
+            </a:r>
+            <a:r>
+              <a:rPr lang="en-US" dirty="0" err="1"/>
+              <a:t>dụng</a:t>
+            </a:r>
+            <a:r>
+              <a:rPr lang="en-US" dirty="0"/>
+              <a:t> Interface</a:t>
+            </a:r>
+          </a:p>
+          <a:p>
+            <a:r>
+              <a:rPr lang="en-US" dirty="0" err="1"/>
+              <a:t>Các</a:t>
+            </a:r>
+            <a:r>
+              <a:rPr lang="en-US" dirty="0"/>
+              <a:t> subclass </a:t>
+            </a:r>
+            <a:r>
+              <a:rPr lang="en-US" dirty="0" err="1"/>
+              <a:t>không</a:t>
+            </a:r>
+            <a:r>
+              <a:rPr lang="en-US" dirty="0"/>
+              <a:t> </a:t>
+            </a:r>
+            <a:r>
+              <a:rPr lang="en-US" dirty="0" err="1"/>
+              <a:t>nhất</a:t>
+            </a:r>
+            <a:r>
+              <a:rPr lang="en-US" dirty="0"/>
+              <a:t> </a:t>
+            </a:r>
+            <a:r>
+              <a:rPr lang="en-US" dirty="0" err="1"/>
+              <a:t>thiết</a:t>
+            </a:r>
+            <a:r>
+              <a:rPr lang="en-US" dirty="0"/>
+              <a:t> </a:t>
+            </a:r>
+            <a:r>
+              <a:rPr lang="en-US" dirty="0" err="1"/>
+              <a:t>thể</a:t>
+            </a:r>
+            <a:r>
+              <a:rPr lang="en-US" dirty="0"/>
+              <a:t> </a:t>
+            </a:r>
+            <a:r>
+              <a:rPr lang="en-US" dirty="0" err="1"/>
+              <a:t>hiện</a:t>
+            </a:r>
+            <a:r>
+              <a:rPr lang="en-US" dirty="0"/>
+              <a:t> </a:t>
+            </a:r>
+            <a:r>
+              <a:rPr lang="en-US" dirty="0" err="1"/>
+              <a:t>các</a:t>
+            </a:r>
+            <a:r>
+              <a:rPr lang="en-US" dirty="0"/>
+              <a:t> </a:t>
+            </a:r>
+            <a:r>
+              <a:rPr lang="en-US" dirty="0" err="1"/>
+              <a:t>hành</a:t>
+            </a:r>
+            <a:r>
+              <a:rPr lang="en-US" dirty="0"/>
+              <a:t> vi </a:t>
+            </a:r>
+            <a:r>
+              <a:rPr lang="en-US" dirty="0" err="1"/>
+              <a:t>dựng</a:t>
+            </a:r>
+            <a:r>
+              <a:rPr lang="en-US" dirty="0"/>
+              <a:t> </a:t>
+            </a:r>
+            <a:r>
+              <a:rPr lang="en-US" dirty="0" err="1"/>
+              <a:t>sẵn</a:t>
+            </a:r>
+            <a:r>
+              <a:rPr lang="en-US" dirty="0"/>
+              <a:t> </a:t>
+            </a:r>
+            <a:r>
+              <a:rPr lang="en-US" dirty="0" err="1"/>
+              <a:t>từ</a:t>
+            </a:r>
+            <a:r>
+              <a:rPr lang="en-US" dirty="0"/>
+              <a:t> interface?</a:t>
             </a:r>
           </a:p>
           <a:p>
             <a:pPr lvl="1"/>
             <a:r>
-              <a:rPr lang="en-US" dirty="0" smtClean="0"/>
-              <a:t>Interface</a:t>
-            </a:r>
-          </a:p>
-          <a:p>
-            <a:pPr lvl="1"/>
-            <a:r>
-              <a:rPr lang="en-US" dirty="0" smtClean="0"/>
-              <a:t>Abstract Class</a:t>
-            </a:r>
-          </a:p>
-          <a:p>
-            <a:r>
-              <a:rPr lang="en-US" dirty="0" err="1" smtClean="0"/>
-              <a:t>Biết</a:t>
-            </a:r>
-            <a:r>
-              <a:rPr lang="en-US" dirty="0" smtClean="0"/>
-              <a:t> </a:t>
-            </a:r>
-            <a:r>
-              <a:rPr lang="en-US" dirty="0" err="1" smtClean="0"/>
-              <a:t>khi</a:t>
-            </a:r>
-            <a:r>
-              <a:rPr lang="en-US" dirty="0" smtClean="0"/>
-              <a:t> </a:t>
-            </a:r>
-            <a:r>
-              <a:rPr lang="en-US" dirty="0" err="1" smtClean="0"/>
-              <a:t>nào</a:t>
-            </a:r>
-            <a:r>
-              <a:rPr lang="en-US" dirty="0" smtClean="0"/>
-              <a:t> </a:t>
-            </a:r>
-            <a:r>
-              <a:rPr lang="en-US" dirty="0" err="1" smtClean="0"/>
-              <a:t>nên</a:t>
-            </a:r>
-            <a:r>
-              <a:rPr lang="en-US" dirty="0" smtClean="0"/>
-              <a:t> </a:t>
-            </a:r>
-            <a:r>
-              <a:rPr lang="en-US" dirty="0" err="1" smtClean="0"/>
+              <a:rPr lang="en-US" dirty="0"/>
+              <a:t>True =&gt; </a:t>
+            </a:r>
+            <a:r>
+              <a:rPr lang="en-US" dirty="0" err="1"/>
+              <a:t>Nên</a:t>
+            </a:r>
+            <a:r>
+              <a:rPr lang="en-US" dirty="0"/>
+              <a:t> </a:t>
+            </a:r>
+            <a:r>
+              <a:rPr lang="en-US" dirty="0" err="1"/>
               <a:t>sử</a:t>
             </a:r>
             <a:r>
-              <a:rPr lang="en-US" dirty="0" smtClean="0"/>
-              <a:t> </a:t>
-            </a:r>
-            <a:r>
-              <a:rPr lang="en-US" dirty="0" err="1" smtClean="0"/>
+              <a:rPr lang="en-US" dirty="0"/>
+              <a:t> </a:t>
+            </a:r>
+            <a:r>
+              <a:rPr lang="en-US" dirty="0" err="1"/>
               <a:t>dụng</a:t>
             </a:r>
             <a:r>
-              <a:rPr lang="en-US" dirty="0" smtClean="0"/>
-              <a:t> Abstract Class</a:t>
-            </a:r>
-          </a:p>
-          <a:p>
-            <a:r>
-              <a:rPr lang="en-US" dirty="0" err="1" smtClean="0"/>
-              <a:t>Khi</a:t>
-            </a:r>
-            <a:r>
-              <a:rPr lang="en-US" dirty="0" smtClean="0"/>
-              <a:t> </a:t>
-            </a:r>
-            <a:r>
-              <a:rPr lang="en-US" dirty="0" err="1" smtClean="0"/>
-              <a:t>nào</a:t>
-            </a:r>
-            <a:r>
-              <a:rPr lang="en-US" dirty="0" smtClean="0"/>
-              <a:t> </a:t>
-            </a:r>
-            <a:r>
-              <a:rPr lang="en-US" dirty="0" err="1" smtClean="0"/>
-              <a:t>nên</a:t>
-            </a:r>
-            <a:r>
-              <a:rPr lang="en-US" dirty="0" smtClean="0"/>
-              <a:t> </a:t>
-            </a:r>
-            <a:r>
-              <a:rPr lang="en-US" dirty="0" err="1" smtClean="0"/>
-              <a:t>sử</a:t>
-            </a:r>
-            <a:r>
-              <a:rPr lang="en-US" dirty="0" smtClean="0"/>
-              <a:t> </a:t>
-            </a:r>
-            <a:r>
-              <a:rPr lang="en-US" dirty="0" err="1" smtClean="0"/>
-              <a:t>dụng</a:t>
-            </a:r>
-            <a:r>
-              <a:rPr lang="en-US" dirty="0" smtClean="0"/>
-              <a:t> </a:t>
-            </a:r>
-            <a:r>
               <a:rPr lang="en-US" dirty="0"/>
-              <a:t>I</a:t>
-            </a:r>
-            <a:r>
-              <a:rPr lang="en-US" dirty="0" smtClean="0"/>
-              <a:t>nterface</a:t>
-            </a:r>
+              <a:t>  Abstract Class</a:t>
+            </a:r>
+          </a:p>
+          <a:p>
             <a:endParaRPr lang="en-US" dirty="0"/>
           </a:p>
         </p:txBody>
@@ -6423,7 +6582,7 @@
     </p:spTree>
     <p:extLst>
       <p:ext uri="{BB962C8B-B14F-4D97-AF65-F5344CB8AC3E}">
-        <p14:creationId xmlns:p14="http://schemas.microsoft.com/office/powerpoint/2010/main" val="2729885414"/>
+        <p14:creationId xmlns:p14="http://schemas.microsoft.com/office/powerpoint/2010/main" val="3444109457"/>
       </p:ext>
     </p:extLst>
   </p:cSld>
@@ -6620,7 +6779,6 @@
               <a:rPr lang="en-US" dirty="0" smtClean="0"/>
               <a:t>Interface</a:t>
             </a:r>
-            <a:endParaRPr lang="en-US" dirty="0" smtClean="0"/>
           </a:p>
           <a:p>
             <a:pPr lvl="1"/>
@@ -6640,7 +6798,6 @@
               <a:rPr lang="en-US" dirty="0" smtClean="0"/>
               <a:t> interface</a:t>
             </a:r>
-            <a:endParaRPr lang="en-US" dirty="0" smtClean="0"/>
           </a:p>
           <a:p>
             <a:r>
@@ -6673,11 +6830,7 @@
             </a:r>
             <a:r>
               <a:rPr lang="en-US" dirty="0" smtClean="0"/>
-              <a:t> </a:t>
-            </a:r>
-            <a:r>
-              <a:rPr lang="en-US" dirty="0" smtClean="0"/>
-              <a:t>Abstract </a:t>
+              <a:t> Abstract </a:t>
             </a:r>
             <a:r>
               <a:rPr lang="en-US" dirty="0" err="1" smtClean="0"/>
@@ -6693,7 +6846,6 @@
               <a:rPr lang="en-US" dirty="0" smtClean="0"/>
               <a:t>Demo</a:t>
             </a:r>
-            <a:endParaRPr lang="en-US" dirty="0" smtClean="0"/>
           </a:p>
         </p:txBody>
       </p:sp>
@@ -6711,6 +6863,247 @@
 </file>
 
 <file path=ppt/slides/slide20.xml><?xml version="1.0" encoding="utf-8"?>
+<p:sld xmlns:a="http://schemas.openxmlformats.org/drawingml/2006/main" xmlns:r="http://schemas.openxmlformats.org/officeDocument/2006/relationships" xmlns:p="http://schemas.openxmlformats.org/presentationml/2006/main">
+  <p:cSld>
+    <p:spTree>
+      <p:nvGrpSpPr>
+        <p:cNvPr id="1" name=""/>
+        <p:cNvGrpSpPr/>
+        <p:nvPr/>
+      </p:nvGrpSpPr>
+      <p:grpSpPr>
+        <a:xfrm>
+          <a:off x="0" y="0"/>
+          <a:ext cx="0" cy="0"/>
+          <a:chOff x="0" y="0"/>
+          <a:chExt cx="0" cy="0"/>
+        </a:xfrm>
+      </p:grpSpPr>
+      <p:sp>
+        <p:nvSpPr>
+          <p:cNvPr id="2" name="Title 1"/>
+          <p:cNvSpPr>
+            <a:spLocks noGrp="1"/>
+          </p:cNvSpPr>
+          <p:nvPr>
+            <p:ph type="title"/>
+          </p:nvPr>
+        </p:nvSpPr>
+        <p:spPr/>
+        <p:txBody>
+          <a:bodyPr/>
+          <a:lstStyle/>
+          <a:p>
+            <a:r>
+              <a:rPr lang="en-US" dirty="0" err="1" smtClean="0"/>
+              <a:t>Tóm</a:t>
+            </a:r>
+            <a:r>
+              <a:rPr lang="en-US" dirty="0" smtClean="0"/>
+              <a:t> </a:t>
+            </a:r>
+            <a:r>
+              <a:rPr lang="en-US" dirty="0" err="1" smtClean="0"/>
+              <a:t>tắt</a:t>
+            </a:r>
+            <a:endParaRPr lang="en-US" dirty="0"/>
+          </a:p>
+        </p:txBody>
+      </p:sp>
+      <p:sp>
+        <p:nvSpPr>
+          <p:cNvPr id="3" name="Content Placeholder 2"/>
+          <p:cNvSpPr>
+            <a:spLocks noGrp="1"/>
+          </p:cNvSpPr>
+          <p:nvPr>
+            <p:ph idx="1"/>
+          </p:nvPr>
+        </p:nvSpPr>
+        <p:spPr/>
+        <p:txBody>
+          <a:bodyPr/>
+          <a:lstStyle/>
+          <a:p>
+            <a:r>
+              <a:rPr lang="en-US" dirty="0" err="1" smtClean="0"/>
+              <a:t>Biết</a:t>
+            </a:r>
+            <a:r>
+              <a:rPr lang="en-US" dirty="0" smtClean="0"/>
+              <a:t> </a:t>
+            </a:r>
+            <a:r>
+              <a:rPr lang="en-US" dirty="0" err="1" smtClean="0"/>
+              <a:t>tính</a:t>
+            </a:r>
+            <a:r>
+              <a:rPr lang="en-US" dirty="0" smtClean="0"/>
+              <a:t> </a:t>
+            </a:r>
+            <a:r>
+              <a:rPr lang="en-US" dirty="0" err="1" smtClean="0"/>
+              <a:t>trừu</a:t>
+            </a:r>
+            <a:r>
+              <a:rPr lang="en-US" dirty="0" smtClean="0"/>
+              <a:t> </a:t>
+            </a:r>
+            <a:r>
+              <a:rPr lang="en-US" dirty="0" err="1" smtClean="0"/>
+              <a:t>tượng</a:t>
+            </a:r>
+            <a:r>
+              <a:rPr lang="en-US" dirty="0" smtClean="0"/>
+              <a:t> </a:t>
+            </a:r>
+            <a:r>
+              <a:rPr lang="en-US" dirty="0" err="1" smtClean="0"/>
+              <a:t>của</a:t>
+            </a:r>
+            <a:r>
+              <a:rPr lang="en-US" dirty="0" smtClean="0"/>
+              <a:t> Java</a:t>
+            </a:r>
+          </a:p>
+          <a:p>
+            <a:pPr lvl="1"/>
+            <a:r>
+              <a:rPr lang="en-US" dirty="0" smtClean="0"/>
+              <a:t>Abstract method</a:t>
+            </a:r>
+          </a:p>
+          <a:p>
+            <a:pPr lvl="1"/>
+            <a:r>
+              <a:rPr lang="en-US" dirty="0" smtClean="0"/>
+              <a:t>Interface</a:t>
+            </a:r>
+          </a:p>
+          <a:p>
+            <a:pPr lvl="1"/>
+            <a:r>
+              <a:rPr lang="en-US" dirty="0" smtClean="0"/>
+              <a:t>Abstract Class</a:t>
+            </a:r>
+          </a:p>
+          <a:p>
+            <a:r>
+              <a:rPr lang="en-US" dirty="0" err="1" smtClean="0"/>
+              <a:t>Biết</a:t>
+            </a:r>
+            <a:r>
+              <a:rPr lang="en-US" dirty="0" smtClean="0"/>
+              <a:t> </a:t>
+            </a:r>
+            <a:r>
+              <a:rPr lang="en-US" dirty="0" err="1" smtClean="0"/>
+              <a:t>khi</a:t>
+            </a:r>
+            <a:r>
+              <a:rPr lang="en-US" dirty="0" smtClean="0"/>
+              <a:t> </a:t>
+            </a:r>
+            <a:r>
+              <a:rPr lang="en-US" dirty="0" err="1" smtClean="0"/>
+              <a:t>nào</a:t>
+            </a:r>
+            <a:r>
+              <a:rPr lang="en-US" dirty="0" smtClean="0"/>
+              <a:t> </a:t>
+            </a:r>
+            <a:r>
+              <a:rPr lang="en-US" dirty="0" err="1" smtClean="0"/>
+              <a:t>nên</a:t>
+            </a:r>
+            <a:r>
+              <a:rPr lang="en-US" dirty="0" smtClean="0"/>
+              <a:t> </a:t>
+            </a:r>
+            <a:r>
+              <a:rPr lang="en-US" dirty="0" err="1" smtClean="0"/>
+              <a:t>sử</a:t>
+            </a:r>
+            <a:r>
+              <a:rPr lang="en-US" dirty="0" smtClean="0"/>
+              <a:t> </a:t>
+            </a:r>
+            <a:r>
+              <a:rPr lang="en-US" dirty="0" err="1" smtClean="0"/>
+              <a:t>dụng</a:t>
+            </a:r>
+            <a:r>
+              <a:rPr lang="en-US" dirty="0" smtClean="0"/>
+              <a:t> Abstract Class</a:t>
+            </a:r>
+          </a:p>
+          <a:p>
+            <a:r>
+              <a:rPr lang="en-US" dirty="0" err="1" smtClean="0"/>
+              <a:t>Khi</a:t>
+            </a:r>
+            <a:r>
+              <a:rPr lang="en-US" dirty="0" smtClean="0"/>
+              <a:t> </a:t>
+            </a:r>
+            <a:r>
+              <a:rPr lang="en-US" dirty="0" err="1" smtClean="0"/>
+              <a:t>nào</a:t>
+            </a:r>
+            <a:r>
+              <a:rPr lang="en-US" dirty="0" smtClean="0"/>
+              <a:t> </a:t>
+            </a:r>
+            <a:r>
+              <a:rPr lang="en-US" dirty="0" err="1" smtClean="0"/>
+              <a:t>nên</a:t>
+            </a:r>
+            <a:r>
+              <a:rPr lang="en-US" dirty="0" smtClean="0"/>
+              <a:t> </a:t>
+            </a:r>
+            <a:r>
+              <a:rPr lang="en-US" dirty="0" err="1" smtClean="0"/>
+              <a:t>sử</a:t>
+            </a:r>
+            <a:r>
+              <a:rPr lang="en-US" dirty="0" smtClean="0"/>
+              <a:t> </a:t>
+            </a:r>
+            <a:r>
+              <a:rPr lang="en-US" dirty="0" err="1" smtClean="0"/>
+              <a:t>dụng</a:t>
+            </a:r>
+            <a:r>
+              <a:rPr lang="en-US" dirty="0" smtClean="0"/>
+              <a:t> </a:t>
+            </a:r>
+            <a:r>
+              <a:rPr lang="en-US" dirty="0"/>
+              <a:t>I</a:t>
+            </a:r>
+            <a:r>
+              <a:rPr lang="en-US" dirty="0" smtClean="0"/>
+              <a:t>nterface</a:t>
+            </a:r>
+            <a:endParaRPr lang="en-US" dirty="0"/>
+          </a:p>
+        </p:txBody>
+      </p:sp>
+    </p:spTree>
+    <p:extLst>
+      <p:ext uri="{BB962C8B-B14F-4D97-AF65-F5344CB8AC3E}">
+        <p14:creationId xmlns:p14="http://schemas.microsoft.com/office/powerpoint/2010/main" val="2729885414"/>
+      </p:ext>
+    </p:extLst>
+  </p:cSld>
+  <p:clrMapOvr>
+    <a:masterClrMapping/>
+  </p:clrMapOvr>
+</p:sld>
+</file>
+
+<file path=ppt/slides/slide21.xml><?xml version="1.0" encoding="utf-8"?>
 <p:sld xmlns:a="http://schemas.openxmlformats.org/drawingml/2006/main" xmlns:r="http://schemas.openxmlformats.org/officeDocument/2006/relationships" xmlns:p="http://schemas.openxmlformats.org/presentationml/2006/main">
   <p:cSld>
     <p:spTree>

</xml_diff>